<commit_message>
Les nouveaux slides, les nouvelles positions
</commit_message>
<xml_diff>
--- a/experience/slides/0_calibration_25square.pptx
+++ b/experience/slides/0_calibration_25square.pptx
@@ -6,30 +6,30 @@
   </p:sldMasterIdLst>
   <p:sldIdLst>
     <p:sldId id="256" r:id="rId2"/>
-    <p:sldId id="257" r:id="rId3"/>
-    <p:sldId id="258" r:id="rId4"/>
-    <p:sldId id="259" r:id="rId5"/>
+    <p:sldId id="258" r:id="rId3"/>
+    <p:sldId id="259" r:id="rId4"/>
+    <p:sldId id="257" r:id="rId5"/>
     <p:sldId id="281" r:id="rId6"/>
-    <p:sldId id="260" r:id="rId7"/>
-    <p:sldId id="261" r:id="rId8"/>
+    <p:sldId id="261" r:id="rId7"/>
+    <p:sldId id="260" r:id="rId8"/>
     <p:sldId id="262" r:id="rId9"/>
     <p:sldId id="263" r:id="rId10"/>
     <p:sldId id="264" r:id="rId11"/>
-    <p:sldId id="265" r:id="rId12"/>
-    <p:sldId id="266" r:id="rId13"/>
+    <p:sldId id="266" r:id="rId12"/>
+    <p:sldId id="265" r:id="rId13"/>
     <p:sldId id="267" r:id="rId14"/>
     <p:sldId id="268" r:id="rId15"/>
     <p:sldId id="269" r:id="rId16"/>
-    <p:sldId id="271" r:id="rId17"/>
-    <p:sldId id="270" r:id="rId18"/>
+    <p:sldId id="270" r:id="rId17"/>
+    <p:sldId id="271" r:id="rId18"/>
     <p:sldId id="272" r:id="rId19"/>
-    <p:sldId id="273" r:id="rId20"/>
-    <p:sldId id="274" r:id="rId21"/>
-    <p:sldId id="275" r:id="rId22"/>
-    <p:sldId id="276" r:id="rId23"/>
-    <p:sldId id="277" r:id="rId24"/>
-    <p:sldId id="278" r:id="rId25"/>
-    <p:sldId id="279" r:id="rId26"/>
+    <p:sldId id="274" r:id="rId20"/>
+    <p:sldId id="275" r:id="rId21"/>
+    <p:sldId id="273" r:id="rId22"/>
+    <p:sldId id="278" r:id="rId23"/>
+    <p:sldId id="279" r:id="rId24"/>
+    <p:sldId id="276" r:id="rId25"/>
+    <p:sldId id="277" r:id="rId26"/>
   </p:sldIdLst>
   <p:sldSz cx="5759450" cy="3240088"/>
   <p:notesSz cx="6858000" cy="9144000"/>
@@ -267,7 +267,7 @@
           <a:p>
             <a:fld id="{FE3AAA13-0B55-4AA1-A7CB-0E7E70B8955A}" type="datetimeFigureOut">
               <a:rPr lang="es-419" smtClean="0"/>
-              <a:t>6/1/2021</a:t>
+              <a:t>11/1/2021</a:t>
             </a:fld>
             <a:endParaRPr lang="es-419"/>
           </a:p>
@@ -445,7 +445,7 @@
           <a:p>
             <a:fld id="{FE3AAA13-0B55-4AA1-A7CB-0E7E70B8955A}" type="datetimeFigureOut">
               <a:rPr lang="es-419" smtClean="0"/>
-              <a:t>6/1/2021</a:t>
+              <a:t>11/1/2021</a:t>
             </a:fld>
             <a:endParaRPr lang="es-419"/>
           </a:p>
@@ -633,7 +633,7 @@
           <a:p>
             <a:fld id="{FE3AAA13-0B55-4AA1-A7CB-0E7E70B8955A}" type="datetimeFigureOut">
               <a:rPr lang="es-419" smtClean="0"/>
-              <a:t>6/1/2021</a:t>
+              <a:t>11/1/2021</a:t>
             </a:fld>
             <a:endParaRPr lang="es-419"/>
           </a:p>
@@ -811,7 +811,7 @@
           <a:p>
             <a:fld id="{FE3AAA13-0B55-4AA1-A7CB-0E7E70B8955A}" type="datetimeFigureOut">
               <a:rPr lang="es-419" smtClean="0"/>
-              <a:t>6/1/2021</a:t>
+              <a:t>11/1/2021</a:t>
             </a:fld>
             <a:endParaRPr lang="es-419"/>
           </a:p>
@@ -1065,7 +1065,7 @@
           <a:p>
             <a:fld id="{FE3AAA13-0B55-4AA1-A7CB-0E7E70B8955A}" type="datetimeFigureOut">
               <a:rPr lang="es-419" smtClean="0"/>
-              <a:t>6/1/2021</a:t>
+              <a:t>11/1/2021</a:t>
             </a:fld>
             <a:endParaRPr lang="es-419"/>
           </a:p>
@@ -1305,7 +1305,7 @@
           <a:p>
             <a:fld id="{FE3AAA13-0B55-4AA1-A7CB-0E7E70B8955A}" type="datetimeFigureOut">
               <a:rPr lang="es-419" smtClean="0"/>
-              <a:t>6/1/2021</a:t>
+              <a:t>11/1/2021</a:t>
             </a:fld>
             <a:endParaRPr lang="es-419"/>
           </a:p>
@@ -1680,7 +1680,7 @@
           <a:p>
             <a:fld id="{FE3AAA13-0B55-4AA1-A7CB-0E7E70B8955A}" type="datetimeFigureOut">
               <a:rPr lang="es-419" smtClean="0"/>
-              <a:t>6/1/2021</a:t>
+              <a:t>11/1/2021</a:t>
             </a:fld>
             <a:endParaRPr lang="es-419"/>
           </a:p>
@@ -1806,7 +1806,7 @@
           <a:p>
             <a:fld id="{FE3AAA13-0B55-4AA1-A7CB-0E7E70B8955A}" type="datetimeFigureOut">
               <a:rPr lang="es-419" smtClean="0"/>
-              <a:t>6/1/2021</a:t>
+              <a:t>11/1/2021</a:t>
             </a:fld>
             <a:endParaRPr lang="es-419"/>
           </a:p>
@@ -1909,7 +1909,7 @@
           <a:p>
             <a:fld id="{FE3AAA13-0B55-4AA1-A7CB-0E7E70B8955A}" type="datetimeFigureOut">
               <a:rPr lang="es-419" smtClean="0"/>
-              <a:t>6/1/2021</a:t>
+              <a:t>11/1/2021</a:t>
             </a:fld>
             <a:endParaRPr lang="es-419"/>
           </a:p>
@@ -2194,7 +2194,7 @@
           <a:p>
             <a:fld id="{FE3AAA13-0B55-4AA1-A7CB-0E7E70B8955A}" type="datetimeFigureOut">
               <a:rPr lang="es-419" smtClean="0"/>
-              <a:t>6/1/2021</a:t>
+              <a:t>11/1/2021</a:t>
             </a:fld>
             <a:endParaRPr lang="es-419"/>
           </a:p>
@@ -2459,7 +2459,7 @@
           <a:p>
             <a:fld id="{FE3AAA13-0B55-4AA1-A7CB-0E7E70B8955A}" type="datetimeFigureOut">
               <a:rPr lang="es-419" smtClean="0"/>
-              <a:t>6/1/2021</a:t>
+              <a:t>11/1/2021</a:t>
             </a:fld>
             <a:endParaRPr lang="es-419"/>
           </a:p>
@@ -2680,7 +2680,7 @@
           <a:p>
             <a:fld id="{FE3AAA13-0B55-4AA1-A7CB-0E7E70B8955A}" type="datetimeFigureOut">
               <a:rPr lang="es-419" smtClean="0"/>
-              <a:t>6/1/2021</a:t>
+              <a:t>11/1/2021</a:t>
             </a:fld>
             <a:endParaRPr lang="es-419"/>
           </a:p>
@@ -3611,6 +3611,264 @@
           <p:cNvPr id="2" name="Groupe 1">
             <a:extLst>
               <a:ext uri="{FF2B5EF4-FFF2-40B4-BE49-F238E27FC236}">
+                <a16:creationId xmlns:a16="http://schemas.microsoft.com/office/drawing/2014/main" id="{E7721058-A4B6-482F-ADE8-9AE280DC6DD2}"/>
+              </a:ext>
+            </a:extLst>
+          </p:cNvPr>
+          <p:cNvGrpSpPr/>
+          <p:nvPr/>
+        </p:nvGrpSpPr>
+        <p:grpSpPr>
+          <a:xfrm>
+            <a:off x="4068000" y="2880000"/>
+            <a:ext cx="360000" cy="360000"/>
+            <a:chOff x="751840" y="670560"/>
+            <a:chExt cx="720000" cy="720000"/>
+          </a:xfrm>
+          <a:solidFill>
+            <a:srgbClr val="00B050"/>
+          </a:solidFill>
+        </p:grpSpPr>
+        <p:sp>
+          <p:nvSpPr>
+            <p:cNvPr id="3" name="Rectangle 2">
+              <a:extLst>
+                <a:ext uri="{FF2B5EF4-FFF2-40B4-BE49-F238E27FC236}">
+                  <a16:creationId xmlns:a16="http://schemas.microsoft.com/office/drawing/2014/main" id="{8CF78F73-F2E2-457C-B256-A71DC5B6EACA}"/>
+                </a:ext>
+              </a:extLst>
+            </p:cNvPr>
+            <p:cNvSpPr/>
+            <p:nvPr/>
+          </p:nvSpPr>
+          <p:spPr>
+            <a:xfrm>
+              <a:off x="751840" y="670560"/>
+              <a:ext cx="720000" cy="720000"/>
+            </a:xfrm>
+            <a:prstGeom prst="rect">
+              <a:avLst/>
+            </a:prstGeom>
+            <a:grpFill/>
+            <a:ln w="9525"/>
+          </p:spPr>
+          <p:style>
+            <a:lnRef idx="2">
+              <a:schemeClr val="accent1">
+                <a:shade val="50000"/>
+              </a:schemeClr>
+            </a:lnRef>
+            <a:fillRef idx="1">
+              <a:schemeClr val="accent1"/>
+            </a:fillRef>
+            <a:effectRef idx="0">
+              <a:schemeClr val="accent1"/>
+            </a:effectRef>
+            <a:fontRef idx="minor">
+              <a:schemeClr val="lt1"/>
+            </a:fontRef>
+          </p:style>
+          <p:txBody>
+            <a:bodyPr rtlCol="0" anchor="ctr"/>
+            <a:lstStyle/>
+            <a:p>
+              <a:pPr algn="ctr"/>
+              <a:endParaRPr lang="es-419" sz="402" dirty="0"/>
+            </a:p>
+          </p:txBody>
+        </p:sp>
+        <p:cxnSp>
+          <p:nvCxnSpPr>
+            <p:cNvPr id="4" name="Connecteur droit 3">
+              <a:extLst>
+                <a:ext uri="{FF2B5EF4-FFF2-40B4-BE49-F238E27FC236}">
+                  <a16:creationId xmlns:a16="http://schemas.microsoft.com/office/drawing/2014/main" id="{0B0F8C44-44B0-4581-8968-001FD82E53EC}"/>
+                </a:ext>
+              </a:extLst>
+            </p:cNvPr>
+            <p:cNvCxnSpPr/>
+            <p:nvPr/>
+          </p:nvCxnSpPr>
+          <p:spPr>
+            <a:xfrm>
+              <a:off x="751840" y="670560"/>
+              <a:ext cx="720000" cy="720000"/>
+            </a:xfrm>
+            <a:prstGeom prst="line">
+              <a:avLst/>
+            </a:prstGeom>
+            <a:grpFill/>
+            <a:ln w="9525">
+              <a:solidFill>
+                <a:schemeClr val="bg1"/>
+              </a:solidFill>
+            </a:ln>
+          </p:spPr>
+          <p:style>
+            <a:lnRef idx="1">
+              <a:schemeClr val="accent1"/>
+            </a:lnRef>
+            <a:fillRef idx="0">
+              <a:schemeClr val="accent1"/>
+            </a:fillRef>
+            <a:effectRef idx="0">
+              <a:schemeClr val="accent1"/>
+            </a:effectRef>
+            <a:fontRef idx="minor">
+              <a:schemeClr val="tx1"/>
+            </a:fontRef>
+          </p:style>
+        </p:cxnSp>
+        <p:cxnSp>
+          <p:nvCxnSpPr>
+            <p:cNvPr id="5" name="Connecteur droit 4">
+              <a:extLst>
+                <a:ext uri="{FF2B5EF4-FFF2-40B4-BE49-F238E27FC236}">
+                  <a16:creationId xmlns:a16="http://schemas.microsoft.com/office/drawing/2014/main" id="{3F14CE77-968C-411C-868A-6336CE814A7E}"/>
+                </a:ext>
+              </a:extLst>
+            </p:cNvPr>
+            <p:cNvCxnSpPr>
+              <a:cxnSpLocks/>
+            </p:cNvCxnSpPr>
+            <p:nvPr/>
+          </p:nvCxnSpPr>
+          <p:spPr>
+            <a:xfrm flipH="1">
+              <a:off x="751840" y="670560"/>
+              <a:ext cx="720000" cy="720000"/>
+            </a:xfrm>
+            <a:prstGeom prst="line">
+              <a:avLst/>
+            </a:prstGeom>
+            <a:grpFill/>
+            <a:ln w="9525">
+              <a:solidFill>
+                <a:schemeClr val="bg1"/>
+              </a:solidFill>
+            </a:ln>
+          </p:spPr>
+          <p:style>
+            <a:lnRef idx="1">
+              <a:schemeClr val="accent1"/>
+            </a:lnRef>
+            <a:fillRef idx="0">
+              <a:schemeClr val="accent1"/>
+            </a:fillRef>
+            <a:effectRef idx="0">
+              <a:schemeClr val="accent1"/>
+            </a:effectRef>
+            <a:fontRef idx="minor">
+              <a:schemeClr val="tx1"/>
+            </a:fontRef>
+          </p:style>
+        </p:cxnSp>
+      </p:grpSp>
+      <p:sp>
+        <p:nvSpPr>
+          <p:cNvPr id="6" name="Ellipse 5">
+            <a:extLst>
+              <a:ext uri="{FF2B5EF4-FFF2-40B4-BE49-F238E27FC236}">
+                <a16:creationId xmlns:a16="http://schemas.microsoft.com/office/drawing/2014/main" id="{BF7A1539-2C0F-42AF-B723-88576783DA9E}"/>
+              </a:ext>
+            </a:extLst>
+          </p:cNvPr>
+          <p:cNvSpPr/>
+          <p:nvPr/>
+        </p:nvSpPr>
+        <p:spPr>
+          <a:xfrm>
+            <a:off x="4230000" y="3042000"/>
+            <a:ext cx="36000" cy="36000"/>
+          </a:xfrm>
+          <a:prstGeom prst="ellipse">
+            <a:avLst/>
+          </a:prstGeom>
+          <a:solidFill>
+            <a:schemeClr val="bg1"/>
+          </a:solidFill>
+          <a:ln w="9525">
+            <a:solidFill>
+              <a:schemeClr val="bg1"/>
+            </a:solidFill>
+          </a:ln>
+          <a:effectLst>
+            <a:glow rad="139700">
+              <a:schemeClr val="accent3">
+                <a:satMod val="175000"/>
+                <a:alpha val="40000"/>
+              </a:schemeClr>
+            </a:glow>
+          </a:effectLst>
+        </p:spPr>
+        <p:style>
+          <a:lnRef idx="2">
+            <a:schemeClr val="accent1">
+              <a:shade val="50000"/>
+            </a:schemeClr>
+          </a:lnRef>
+          <a:fillRef idx="1">
+            <a:schemeClr val="accent1"/>
+          </a:fillRef>
+          <a:effectRef idx="0">
+            <a:schemeClr val="accent1"/>
+          </a:effectRef>
+          <a:fontRef idx="minor">
+            <a:schemeClr val="lt1"/>
+          </a:fontRef>
+        </p:style>
+        <p:txBody>
+          <a:bodyPr rtlCol="0" anchor="ctr"/>
+          <a:lstStyle/>
+          <a:p>
+            <a:pPr algn="ctr"/>
+            <a:endParaRPr lang="es-419" sz="402" dirty="0"/>
+          </a:p>
+        </p:txBody>
+      </p:sp>
+    </p:spTree>
+    <p:extLst>
+      <p:ext uri="{BB962C8B-B14F-4D97-AF65-F5344CB8AC3E}">
+        <p14:creationId xmlns:p14="http://schemas.microsoft.com/office/powerpoint/2010/main" val="725459178"/>
+      </p:ext>
+    </p:extLst>
+  </p:cSld>
+  <p:clrMapOvr>
+    <a:masterClrMapping/>
+  </p:clrMapOvr>
+  <mc:AlternateContent xmlns:mc="http://schemas.openxmlformats.org/markup-compatibility/2006" xmlns:p14="http://schemas.microsoft.com/office/powerpoint/2010/main">
+    <mc:Choice Requires="p14">
+      <p:transition spd="slow" p14:dur="2000" advClick="0" advTm="2000"/>
+    </mc:Choice>
+    <mc:Fallback xmlns="">
+      <p:transition spd="slow" advClick="0" advTm="2000"/>
+    </mc:Fallback>
+  </mc:AlternateContent>
+</p:sld>
+</file>
+
+<file path=ppt/slides/slide12.xml><?xml version="1.0" encoding="utf-8"?>
+<p:sld xmlns:a="http://schemas.openxmlformats.org/drawingml/2006/main" xmlns:r="http://schemas.openxmlformats.org/officeDocument/2006/relationships" xmlns:p="http://schemas.openxmlformats.org/presentationml/2006/main">
+  <p:cSld>
+    <p:spTree>
+      <p:nvGrpSpPr>
+        <p:cNvPr id="1" name=""/>
+        <p:cNvGrpSpPr/>
+        <p:nvPr/>
+      </p:nvGrpSpPr>
+      <p:grpSpPr>
+        <a:xfrm>
+          <a:off x="0" y="0"/>
+          <a:ext cx="0" cy="0"/>
+          <a:chOff x="0" y="0"/>
+          <a:chExt cx="0" cy="0"/>
+        </a:xfrm>
+      </p:grpSpPr>
+      <p:grpSp>
+        <p:nvGrpSpPr>
+          <p:cNvPr id="2" name="Groupe 1">
+            <a:extLst>
+              <a:ext uri="{FF2B5EF4-FFF2-40B4-BE49-F238E27FC236}">
                 <a16:creationId xmlns:a16="http://schemas.microsoft.com/office/drawing/2014/main" id="{7623BD40-003C-4CB3-8DB4-980415C1DC63}"/>
               </a:ext>
             </a:extLst>
@@ -3830,264 +4088,6 @@
     <p:extLst>
       <p:ext uri="{BB962C8B-B14F-4D97-AF65-F5344CB8AC3E}">
         <p14:creationId xmlns:p14="http://schemas.microsoft.com/office/powerpoint/2010/main" val="153529272"/>
-      </p:ext>
-    </p:extLst>
-  </p:cSld>
-  <p:clrMapOvr>
-    <a:masterClrMapping/>
-  </p:clrMapOvr>
-  <mc:AlternateContent xmlns:mc="http://schemas.openxmlformats.org/markup-compatibility/2006" xmlns:p14="http://schemas.microsoft.com/office/powerpoint/2010/main">
-    <mc:Choice Requires="p14">
-      <p:transition spd="slow" p14:dur="2000" advClick="0" advTm="2000"/>
-    </mc:Choice>
-    <mc:Fallback xmlns="">
-      <p:transition spd="slow" advClick="0" advTm="2000"/>
-    </mc:Fallback>
-  </mc:AlternateContent>
-</p:sld>
-</file>
-
-<file path=ppt/slides/slide12.xml><?xml version="1.0" encoding="utf-8"?>
-<p:sld xmlns:a="http://schemas.openxmlformats.org/drawingml/2006/main" xmlns:r="http://schemas.openxmlformats.org/officeDocument/2006/relationships" xmlns:p="http://schemas.openxmlformats.org/presentationml/2006/main">
-  <p:cSld>
-    <p:spTree>
-      <p:nvGrpSpPr>
-        <p:cNvPr id="1" name=""/>
-        <p:cNvGrpSpPr/>
-        <p:nvPr/>
-      </p:nvGrpSpPr>
-      <p:grpSpPr>
-        <a:xfrm>
-          <a:off x="0" y="0"/>
-          <a:ext cx="0" cy="0"/>
-          <a:chOff x="0" y="0"/>
-          <a:chExt cx="0" cy="0"/>
-        </a:xfrm>
-      </p:grpSpPr>
-      <p:grpSp>
-        <p:nvGrpSpPr>
-          <p:cNvPr id="2" name="Groupe 1">
-            <a:extLst>
-              <a:ext uri="{FF2B5EF4-FFF2-40B4-BE49-F238E27FC236}">
-                <a16:creationId xmlns:a16="http://schemas.microsoft.com/office/drawing/2014/main" id="{E7721058-A4B6-482F-ADE8-9AE280DC6DD2}"/>
-              </a:ext>
-            </a:extLst>
-          </p:cNvPr>
-          <p:cNvGrpSpPr/>
-          <p:nvPr/>
-        </p:nvGrpSpPr>
-        <p:grpSpPr>
-          <a:xfrm>
-            <a:off x="4068000" y="2880000"/>
-            <a:ext cx="360000" cy="360000"/>
-            <a:chOff x="751840" y="670560"/>
-            <a:chExt cx="720000" cy="720000"/>
-          </a:xfrm>
-          <a:solidFill>
-            <a:srgbClr val="00B050"/>
-          </a:solidFill>
-        </p:grpSpPr>
-        <p:sp>
-          <p:nvSpPr>
-            <p:cNvPr id="3" name="Rectangle 2">
-              <a:extLst>
-                <a:ext uri="{FF2B5EF4-FFF2-40B4-BE49-F238E27FC236}">
-                  <a16:creationId xmlns:a16="http://schemas.microsoft.com/office/drawing/2014/main" id="{8CF78F73-F2E2-457C-B256-A71DC5B6EACA}"/>
-                </a:ext>
-              </a:extLst>
-            </p:cNvPr>
-            <p:cNvSpPr/>
-            <p:nvPr/>
-          </p:nvSpPr>
-          <p:spPr>
-            <a:xfrm>
-              <a:off x="751840" y="670560"/>
-              <a:ext cx="720000" cy="720000"/>
-            </a:xfrm>
-            <a:prstGeom prst="rect">
-              <a:avLst/>
-            </a:prstGeom>
-            <a:grpFill/>
-            <a:ln w="9525"/>
-          </p:spPr>
-          <p:style>
-            <a:lnRef idx="2">
-              <a:schemeClr val="accent1">
-                <a:shade val="50000"/>
-              </a:schemeClr>
-            </a:lnRef>
-            <a:fillRef idx="1">
-              <a:schemeClr val="accent1"/>
-            </a:fillRef>
-            <a:effectRef idx="0">
-              <a:schemeClr val="accent1"/>
-            </a:effectRef>
-            <a:fontRef idx="minor">
-              <a:schemeClr val="lt1"/>
-            </a:fontRef>
-          </p:style>
-          <p:txBody>
-            <a:bodyPr rtlCol="0" anchor="ctr"/>
-            <a:lstStyle/>
-            <a:p>
-              <a:pPr algn="ctr"/>
-              <a:endParaRPr lang="es-419" sz="402" dirty="0"/>
-            </a:p>
-          </p:txBody>
-        </p:sp>
-        <p:cxnSp>
-          <p:nvCxnSpPr>
-            <p:cNvPr id="4" name="Connecteur droit 3">
-              <a:extLst>
-                <a:ext uri="{FF2B5EF4-FFF2-40B4-BE49-F238E27FC236}">
-                  <a16:creationId xmlns:a16="http://schemas.microsoft.com/office/drawing/2014/main" id="{0B0F8C44-44B0-4581-8968-001FD82E53EC}"/>
-                </a:ext>
-              </a:extLst>
-            </p:cNvPr>
-            <p:cNvCxnSpPr/>
-            <p:nvPr/>
-          </p:nvCxnSpPr>
-          <p:spPr>
-            <a:xfrm>
-              <a:off x="751840" y="670560"/>
-              <a:ext cx="720000" cy="720000"/>
-            </a:xfrm>
-            <a:prstGeom prst="line">
-              <a:avLst/>
-            </a:prstGeom>
-            <a:grpFill/>
-            <a:ln w="9525">
-              <a:solidFill>
-                <a:schemeClr val="bg1"/>
-              </a:solidFill>
-            </a:ln>
-          </p:spPr>
-          <p:style>
-            <a:lnRef idx="1">
-              <a:schemeClr val="accent1"/>
-            </a:lnRef>
-            <a:fillRef idx="0">
-              <a:schemeClr val="accent1"/>
-            </a:fillRef>
-            <a:effectRef idx="0">
-              <a:schemeClr val="accent1"/>
-            </a:effectRef>
-            <a:fontRef idx="minor">
-              <a:schemeClr val="tx1"/>
-            </a:fontRef>
-          </p:style>
-        </p:cxnSp>
-        <p:cxnSp>
-          <p:nvCxnSpPr>
-            <p:cNvPr id="5" name="Connecteur droit 4">
-              <a:extLst>
-                <a:ext uri="{FF2B5EF4-FFF2-40B4-BE49-F238E27FC236}">
-                  <a16:creationId xmlns:a16="http://schemas.microsoft.com/office/drawing/2014/main" id="{3F14CE77-968C-411C-868A-6336CE814A7E}"/>
-                </a:ext>
-              </a:extLst>
-            </p:cNvPr>
-            <p:cNvCxnSpPr>
-              <a:cxnSpLocks/>
-            </p:cNvCxnSpPr>
-            <p:nvPr/>
-          </p:nvCxnSpPr>
-          <p:spPr>
-            <a:xfrm flipH="1">
-              <a:off x="751840" y="670560"/>
-              <a:ext cx="720000" cy="720000"/>
-            </a:xfrm>
-            <a:prstGeom prst="line">
-              <a:avLst/>
-            </a:prstGeom>
-            <a:grpFill/>
-            <a:ln w="9525">
-              <a:solidFill>
-                <a:schemeClr val="bg1"/>
-              </a:solidFill>
-            </a:ln>
-          </p:spPr>
-          <p:style>
-            <a:lnRef idx="1">
-              <a:schemeClr val="accent1"/>
-            </a:lnRef>
-            <a:fillRef idx="0">
-              <a:schemeClr val="accent1"/>
-            </a:fillRef>
-            <a:effectRef idx="0">
-              <a:schemeClr val="accent1"/>
-            </a:effectRef>
-            <a:fontRef idx="minor">
-              <a:schemeClr val="tx1"/>
-            </a:fontRef>
-          </p:style>
-        </p:cxnSp>
-      </p:grpSp>
-      <p:sp>
-        <p:nvSpPr>
-          <p:cNvPr id="6" name="Ellipse 5">
-            <a:extLst>
-              <a:ext uri="{FF2B5EF4-FFF2-40B4-BE49-F238E27FC236}">
-                <a16:creationId xmlns:a16="http://schemas.microsoft.com/office/drawing/2014/main" id="{BF7A1539-2C0F-42AF-B723-88576783DA9E}"/>
-              </a:ext>
-            </a:extLst>
-          </p:cNvPr>
-          <p:cNvSpPr/>
-          <p:nvPr/>
-        </p:nvSpPr>
-        <p:spPr>
-          <a:xfrm>
-            <a:off x="4230000" y="3042000"/>
-            <a:ext cx="36000" cy="36000"/>
-          </a:xfrm>
-          <a:prstGeom prst="ellipse">
-            <a:avLst/>
-          </a:prstGeom>
-          <a:solidFill>
-            <a:schemeClr val="bg1"/>
-          </a:solidFill>
-          <a:ln w="9525">
-            <a:solidFill>
-              <a:schemeClr val="bg1"/>
-            </a:solidFill>
-          </a:ln>
-          <a:effectLst>
-            <a:glow rad="139700">
-              <a:schemeClr val="accent3">
-                <a:satMod val="175000"/>
-                <a:alpha val="40000"/>
-              </a:schemeClr>
-            </a:glow>
-          </a:effectLst>
-        </p:spPr>
-        <p:style>
-          <a:lnRef idx="2">
-            <a:schemeClr val="accent1">
-              <a:shade val="50000"/>
-            </a:schemeClr>
-          </a:lnRef>
-          <a:fillRef idx="1">
-            <a:schemeClr val="accent1"/>
-          </a:fillRef>
-          <a:effectRef idx="0">
-            <a:schemeClr val="accent1"/>
-          </a:effectRef>
-          <a:fontRef idx="minor">
-            <a:schemeClr val="lt1"/>
-          </a:fontRef>
-        </p:style>
-        <p:txBody>
-          <a:bodyPr rtlCol="0" anchor="ctr"/>
-          <a:lstStyle/>
-          <a:p>
-            <a:pPr algn="ctr"/>
-            <a:endParaRPr lang="es-419" sz="402" dirty="0"/>
-          </a:p>
-        </p:txBody>
-      </p:sp>
-    </p:spTree>
-    <p:extLst>
-      <p:ext uri="{BB962C8B-B14F-4D97-AF65-F5344CB8AC3E}">
-        <p14:creationId xmlns:p14="http://schemas.microsoft.com/office/powerpoint/2010/main" val="725459178"/>
       </p:ext>
     </p:extLst>
   </p:cSld>
@@ -4901,6 +4901,264 @@
           <p:cNvPr id="2" name="Groupe 1">
             <a:extLst>
               <a:ext uri="{FF2B5EF4-FFF2-40B4-BE49-F238E27FC236}">
+                <a16:creationId xmlns:a16="http://schemas.microsoft.com/office/drawing/2014/main" id="{BC0E94ED-5B61-4E73-85AB-AE92F23635C9}"/>
+              </a:ext>
+            </a:extLst>
+          </p:cNvPr>
+          <p:cNvGrpSpPr/>
+          <p:nvPr/>
+        </p:nvGrpSpPr>
+        <p:grpSpPr>
+          <a:xfrm>
+            <a:off x="0" y="2177835"/>
+            <a:ext cx="360000" cy="360000"/>
+            <a:chOff x="751840" y="670560"/>
+            <a:chExt cx="720000" cy="720000"/>
+          </a:xfrm>
+          <a:solidFill>
+            <a:srgbClr val="FF832F"/>
+          </a:solidFill>
+        </p:grpSpPr>
+        <p:sp>
+          <p:nvSpPr>
+            <p:cNvPr id="3" name="Rectangle 2">
+              <a:extLst>
+                <a:ext uri="{FF2B5EF4-FFF2-40B4-BE49-F238E27FC236}">
+                  <a16:creationId xmlns:a16="http://schemas.microsoft.com/office/drawing/2014/main" id="{6061DD14-EF18-472C-A02B-783A64C144D6}"/>
+                </a:ext>
+              </a:extLst>
+            </p:cNvPr>
+            <p:cNvSpPr/>
+            <p:nvPr/>
+          </p:nvSpPr>
+          <p:spPr>
+            <a:xfrm>
+              <a:off x="751840" y="670560"/>
+              <a:ext cx="720000" cy="720000"/>
+            </a:xfrm>
+            <a:prstGeom prst="rect">
+              <a:avLst/>
+            </a:prstGeom>
+            <a:grpFill/>
+            <a:ln w="9525"/>
+          </p:spPr>
+          <p:style>
+            <a:lnRef idx="2">
+              <a:schemeClr val="accent1">
+                <a:shade val="50000"/>
+              </a:schemeClr>
+            </a:lnRef>
+            <a:fillRef idx="1">
+              <a:schemeClr val="accent1"/>
+            </a:fillRef>
+            <a:effectRef idx="0">
+              <a:schemeClr val="accent1"/>
+            </a:effectRef>
+            <a:fontRef idx="minor">
+              <a:schemeClr val="lt1"/>
+            </a:fontRef>
+          </p:style>
+          <p:txBody>
+            <a:bodyPr rtlCol="0" anchor="ctr"/>
+            <a:lstStyle/>
+            <a:p>
+              <a:pPr algn="ctr"/>
+              <a:endParaRPr lang="es-419" sz="402" dirty="0"/>
+            </a:p>
+          </p:txBody>
+        </p:sp>
+        <p:cxnSp>
+          <p:nvCxnSpPr>
+            <p:cNvPr id="4" name="Connecteur droit 3">
+              <a:extLst>
+                <a:ext uri="{FF2B5EF4-FFF2-40B4-BE49-F238E27FC236}">
+                  <a16:creationId xmlns:a16="http://schemas.microsoft.com/office/drawing/2014/main" id="{1C6997AC-5CC2-4ACA-9962-86E75E1248D6}"/>
+                </a:ext>
+              </a:extLst>
+            </p:cNvPr>
+            <p:cNvCxnSpPr/>
+            <p:nvPr/>
+          </p:nvCxnSpPr>
+          <p:spPr>
+            <a:xfrm>
+              <a:off x="751840" y="670560"/>
+              <a:ext cx="720000" cy="720000"/>
+            </a:xfrm>
+            <a:prstGeom prst="line">
+              <a:avLst/>
+            </a:prstGeom>
+            <a:grpFill/>
+            <a:ln w="9525">
+              <a:solidFill>
+                <a:schemeClr val="bg1"/>
+              </a:solidFill>
+            </a:ln>
+          </p:spPr>
+          <p:style>
+            <a:lnRef idx="1">
+              <a:schemeClr val="accent1"/>
+            </a:lnRef>
+            <a:fillRef idx="0">
+              <a:schemeClr val="accent1"/>
+            </a:fillRef>
+            <a:effectRef idx="0">
+              <a:schemeClr val="accent1"/>
+            </a:effectRef>
+            <a:fontRef idx="minor">
+              <a:schemeClr val="tx1"/>
+            </a:fontRef>
+          </p:style>
+        </p:cxnSp>
+        <p:cxnSp>
+          <p:nvCxnSpPr>
+            <p:cNvPr id="5" name="Connecteur droit 4">
+              <a:extLst>
+                <a:ext uri="{FF2B5EF4-FFF2-40B4-BE49-F238E27FC236}">
+                  <a16:creationId xmlns:a16="http://schemas.microsoft.com/office/drawing/2014/main" id="{E95C717B-712E-4DE4-84AD-F4988E4A278A}"/>
+                </a:ext>
+              </a:extLst>
+            </p:cNvPr>
+            <p:cNvCxnSpPr>
+              <a:cxnSpLocks/>
+            </p:cNvCxnSpPr>
+            <p:nvPr/>
+          </p:nvCxnSpPr>
+          <p:spPr>
+            <a:xfrm flipH="1">
+              <a:off x="751840" y="670560"/>
+              <a:ext cx="720000" cy="720000"/>
+            </a:xfrm>
+            <a:prstGeom prst="line">
+              <a:avLst/>
+            </a:prstGeom>
+            <a:grpFill/>
+            <a:ln w="9525">
+              <a:solidFill>
+                <a:schemeClr val="bg1"/>
+              </a:solidFill>
+            </a:ln>
+          </p:spPr>
+          <p:style>
+            <a:lnRef idx="1">
+              <a:schemeClr val="accent1"/>
+            </a:lnRef>
+            <a:fillRef idx="0">
+              <a:schemeClr val="accent1"/>
+            </a:fillRef>
+            <a:effectRef idx="0">
+              <a:schemeClr val="accent1"/>
+            </a:effectRef>
+            <a:fontRef idx="minor">
+              <a:schemeClr val="tx1"/>
+            </a:fontRef>
+          </p:style>
+        </p:cxnSp>
+      </p:grpSp>
+      <p:sp>
+        <p:nvSpPr>
+          <p:cNvPr id="6" name="Ellipse 5">
+            <a:extLst>
+              <a:ext uri="{FF2B5EF4-FFF2-40B4-BE49-F238E27FC236}">
+                <a16:creationId xmlns:a16="http://schemas.microsoft.com/office/drawing/2014/main" id="{43C33D7D-FE99-4A13-80DC-ADC9243D7CD7}"/>
+              </a:ext>
+            </a:extLst>
+          </p:cNvPr>
+          <p:cNvSpPr/>
+          <p:nvPr/>
+        </p:nvSpPr>
+        <p:spPr>
+          <a:xfrm>
+            <a:off x="162000" y="2339835"/>
+            <a:ext cx="36000" cy="36000"/>
+          </a:xfrm>
+          <a:prstGeom prst="ellipse">
+            <a:avLst/>
+          </a:prstGeom>
+          <a:solidFill>
+            <a:schemeClr val="bg1"/>
+          </a:solidFill>
+          <a:ln w="9525">
+            <a:solidFill>
+              <a:schemeClr val="bg1"/>
+            </a:solidFill>
+          </a:ln>
+          <a:effectLst>
+            <a:glow rad="139700">
+              <a:schemeClr val="accent3">
+                <a:satMod val="175000"/>
+                <a:alpha val="40000"/>
+              </a:schemeClr>
+            </a:glow>
+          </a:effectLst>
+        </p:spPr>
+        <p:style>
+          <a:lnRef idx="2">
+            <a:schemeClr val="accent1">
+              <a:shade val="50000"/>
+            </a:schemeClr>
+          </a:lnRef>
+          <a:fillRef idx="1">
+            <a:schemeClr val="accent1"/>
+          </a:fillRef>
+          <a:effectRef idx="0">
+            <a:schemeClr val="accent1"/>
+          </a:effectRef>
+          <a:fontRef idx="minor">
+            <a:schemeClr val="lt1"/>
+          </a:fontRef>
+        </p:style>
+        <p:txBody>
+          <a:bodyPr rtlCol="0" anchor="ctr"/>
+          <a:lstStyle/>
+          <a:p>
+            <a:pPr algn="ctr"/>
+            <a:endParaRPr lang="es-419" sz="402" dirty="0"/>
+          </a:p>
+        </p:txBody>
+      </p:sp>
+    </p:spTree>
+    <p:extLst>
+      <p:ext uri="{BB962C8B-B14F-4D97-AF65-F5344CB8AC3E}">
+        <p14:creationId xmlns:p14="http://schemas.microsoft.com/office/powerpoint/2010/main" val="3504251319"/>
+      </p:ext>
+    </p:extLst>
+  </p:cSld>
+  <p:clrMapOvr>
+    <a:masterClrMapping/>
+  </p:clrMapOvr>
+  <mc:AlternateContent xmlns:mc="http://schemas.openxmlformats.org/markup-compatibility/2006" xmlns:p14="http://schemas.microsoft.com/office/powerpoint/2010/main">
+    <mc:Choice Requires="p14">
+      <p:transition spd="slow" p14:dur="2000" advClick="0" advTm="2000"/>
+    </mc:Choice>
+    <mc:Fallback xmlns="">
+      <p:transition spd="slow" advClick="0" advTm="2000"/>
+    </mc:Fallback>
+  </mc:AlternateContent>
+</p:sld>
+</file>
+
+<file path=ppt/slides/slide17.xml><?xml version="1.0" encoding="utf-8"?>
+<p:sld xmlns:a="http://schemas.openxmlformats.org/drawingml/2006/main" xmlns:r="http://schemas.openxmlformats.org/officeDocument/2006/relationships" xmlns:p="http://schemas.openxmlformats.org/presentationml/2006/main">
+  <p:cSld>
+    <p:spTree>
+      <p:nvGrpSpPr>
+        <p:cNvPr id="1" name=""/>
+        <p:cNvGrpSpPr/>
+        <p:nvPr/>
+      </p:nvGrpSpPr>
+      <p:grpSpPr>
+        <a:xfrm>
+          <a:off x="0" y="0"/>
+          <a:ext cx="0" cy="0"/>
+          <a:chOff x="0" y="0"/>
+          <a:chExt cx="0" cy="0"/>
+        </a:xfrm>
+      </p:grpSpPr>
+      <p:grpSp>
+        <p:nvGrpSpPr>
+          <p:cNvPr id="2" name="Groupe 1">
+            <a:extLst>
+              <a:ext uri="{FF2B5EF4-FFF2-40B4-BE49-F238E27FC236}">
                 <a16:creationId xmlns:a16="http://schemas.microsoft.com/office/drawing/2014/main" id="{BABD5C29-D4AA-4A84-9EB7-D24F38F009F8}"/>
               </a:ext>
             </a:extLst>
@@ -5120,264 +5378,6 @@
     <p:extLst>
       <p:ext uri="{BB962C8B-B14F-4D97-AF65-F5344CB8AC3E}">
         <p14:creationId xmlns:p14="http://schemas.microsoft.com/office/powerpoint/2010/main" val="2888279333"/>
-      </p:ext>
-    </p:extLst>
-  </p:cSld>
-  <p:clrMapOvr>
-    <a:masterClrMapping/>
-  </p:clrMapOvr>
-  <mc:AlternateContent xmlns:mc="http://schemas.openxmlformats.org/markup-compatibility/2006" xmlns:p14="http://schemas.microsoft.com/office/powerpoint/2010/main">
-    <mc:Choice Requires="p14">
-      <p:transition spd="slow" p14:dur="2000" advClick="0" advTm="2000"/>
-    </mc:Choice>
-    <mc:Fallback xmlns="">
-      <p:transition spd="slow" advClick="0" advTm="2000"/>
-    </mc:Fallback>
-  </mc:AlternateContent>
-</p:sld>
-</file>
-
-<file path=ppt/slides/slide17.xml><?xml version="1.0" encoding="utf-8"?>
-<p:sld xmlns:a="http://schemas.openxmlformats.org/drawingml/2006/main" xmlns:r="http://schemas.openxmlformats.org/officeDocument/2006/relationships" xmlns:p="http://schemas.openxmlformats.org/presentationml/2006/main">
-  <p:cSld>
-    <p:spTree>
-      <p:nvGrpSpPr>
-        <p:cNvPr id="1" name=""/>
-        <p:cNvGrpSpPr/>
-        <p:nvPr/>
-      </p:nvGrpSpPr>
-      <p:grpSpPr>
-        <a:xfrm>
-          <a:off x="0" y="0"/>
-          <a:ext cx="0" cy="0"/>
-          <a:chOff x="0" y="0"/>
-          <a:chExt cx="0" cy="0"/>
-        </a:xfrm>
-      </p:grpSpPr>
-      <p:grpSp>
-        <p:nvGrpSpPr>
-          <p:cNvPr id="2" name="Groupe 1">
-            <a:extLst>
-              <a:ext uri="{FF2B5EF4-FFF2-40B4-BE49-F238E27FC236}">
-                <a16:creationId xmlns:a16="http://schemas.microsoft.com/office/drawing/2014/main" id="{BC0E94ED-5B61-4E73-85AB-AE92F23635C9}"/>
-              </a:ext>
-            </a:extLst>
-          </p:cNvPr>
-          <p:cNvGrpSpPr/>
-          <p:nvPr/>
-        </p:nvGrpSpPr>
-        <p:grpSpPr>
-          <a:xfrm>
-            <a:off x="0" y="2177835"/>
-            <a:ext cx="360000" cy="360000"/>
-            <a:chOff x="751840" y="670560"/>
-            <a:chExt cx="720000" cy="720000"/>
-          </a:xfrm>
-          <a:solidFill>
-            <a:srgbClr val="FF832F"/>
-          </a:solidFill>
-        </p:grpSpPr>
-        <p:sp>
-          <p:nvSpPr>
-            <p:cNvPr id="3" name="Rectangle 2">
-              <a:extLst>
-                <a:ext uri="{FF2B5EF4-FFF2-40B4-BE49-F238E27FC236}">
-                  <a16:creationId xmlns:a16="http://schemas.microsoft.com/office/drawing/2014/main" id="{6061DD14-EF18-472C-A02B-783A64C144D6}"/>
-                </a:ext>
-              </a:extLst>
-            </p:cNvPr>
-            <p:cNvSpPr/>
-            <p:nvPr/>
-          </p:nvSpPr>
-          <p:spPr>
-            <a:xfrm>
-              <a:off x="751840" y="670560"/>
-              <a:ext cx="720000" cy="720000"/>
-            </a:xfrm>
-            <a:prstGeom prst="rect">
-              <a:avLst/>
-            </a:prstGeom>
-            <a:grpFill/>
-            <a:ln w="9525"/>
-          </p:spPr>
-          <p:style>
-            <a:lnRef idx="2">
-              <a:schemeClr val="accent1">
-                <a:shade val="50000"/>
-              </a:schemeClr>
-            </a:lnRef>
-            <a:fillRef idx="1">
-              <a:schemeClr val="accent1"/>
-            </a:fillRef>
-            <a:effectRef idx="0">
-              <a:schemeClr val="accent1"/>
-            </a:effectRef>
-            <a:fontRef idx="minor">
-              <a:schemeClr val="lt1"/>
-            </a:fontRef>
-          </p:style>
-          <p:txBody>
-            <a:bodyPr rtlCol="0" anchor="ctr"/>
-            <a:lstStyle/>
-            <a:p>
-              <a:pPr algn="ctr"/>
-              <a:endParaRPr lang="es-419" sz="402" dirty="0"/>
-            </a:p>
-          </p:txBody>
-        </p:sp>
-        <p:cxnSp>
-          <p:nvCxnSpPr>
-            <p:cNvPr id="4" name="Connecteur droit 3">
-              <a:extLst>
-                <a:ext uri="{FF2B5EF4-FFF2-40B4-BE49-F238E27FC236}">
-                  <a16:creationId xmlns:a16="http://schemas.microsoft.com/office/drawing/2014/main" id="{1C6997AC-5CC2-4ACA-9962-86E75E1248D6}"/>
-                </a:ext>
-              </a:extLst>
-            </p:cNvPr>
-            <p:cNvCxnSpPr/>
-            <p:nvPr/>
-          </p:nvCxnSpPr>
-          <p:spPr>
-            <a:xfrm>
-              <a:off x="751840" y="670560"/>
-              <a:ext cx="720000" cy="720000"/>
-            </a:xfrm>
-            <a:prstGeom prst="line">
-              <a:avLst/>
-            </a:prstGeom>
-            <a:grpFill/>
-            <a:ln w="9525">
-              <a:solidFill>
-                <a:schemeClr val="bg1"/>
-              </a:solidFill>
-            </a:ln>
-          </p:spPr>
-          <p:style>
-            <a:lnRef idx="1">
-              <a:schemeClr val="accent1"/>
-            </a:lnRef>
-            <a:fillRef idx="0">
-              <a:schemeClr val="accent1"/>
-            </a:fillRef>
-            <a:effectRef idx="0">
-              <a:schemeClr val="accent1"/>
-            </a:effectRef>
-            <a:fontRef idx="minor">
-              <a:schemeClr val="tx1"/>
-            </a:fontRef>
-          </p:style>
-        </p:cxnSp>
-        <p:cxnSp>
-          <p:nvCxnSpPr>
-            <p:cNvPr id="5" name="Connecteur droit 4">
-              <a:extLst>
-                <a:ext uri="{FF2B5EF4-FFF2-40B4-BE49-F238E27FC236}">
-                  <a16:creationId xmlns:a16="http://schemas.microsoft.com/office/drawing/2014/main" id="{E95C717B-712E-4DE4-84AD-F4988E4A278A}"/>
-                </a:ext>
-              </a:extLst>
-            </p:cNvPr>
-            <p:cNvCxnSpPr>
-              <a:cxnSpLocks/>
-            </p:cNvCxnSpPr>
-            <p:nvPr/>
-          </p:nvCxnSpPr>
-          <p:spPr>
-            <a:xfrm flipH="1">
-              <a:off x="751840" y="670560"/>
-              <a:ext cx="720000" cy="720000"/>
-            </a:xfrm>
-            <a:prstGeom prst="line">
-              <a:avLst/>
-            </a:prstGeom>
-            <a:grpFill/>
-            <a:ln w="9525">
-              <a:solidFill>
-                <a:schemeClr val="bg1"/>
-              </a:solidFill>
-            </a:ln>
-          </p:spPr>
-          <p:style>
-            <a:lnRef idx="1">
-              <a:schemeClr val="accent1"/>
-            </a:lnRef>
-            <a:fillRef idx="0">
-              <a:schemeClr val="accent1"/>
-            </a:fillRef>
-            <a:effectRef idx="0">
-              <a:schemeClr val="accent1"/>
-            </a:effectRef>
-            <a:fontRef idx="minor">
-              <a:schemeClr val="tx1"/>
-            </a:fontRef>
-          </p:style>
-        </p:cxnSp>
-      </p:grpSp>
-      <p:sp>
-        <p:nvSpPr>
-          <p:cNvPr id="6" name="Ellipse 5">
-            <a:extLst>
-              <a:ext uri="{FF2B5EF4-FFF2-40B4-BE49-F238E27FC236}">
-                <a16:creationId xmlns:a16="http://schemas.microsoft.com/office/drawing/2014/main" id="{43C33D7D-FE99-4A13-80DC-ADC9243D7CD7}"/>
-              </a:ext>
-            </a:extLst>
-          </p:cNvPr>
-          <p:cNvSpPr/>
-          <p:nvPr/>
-        </p:nvSpPr>
-        <p:spPr>
-          <a:xfrm>
-            <a:off x="162000" y="2339835"/>
-            <a:ext cx="36000" cy="36000"/>
-          </a:xfrm>
-          <a:prstGeom prst="ellipse">
-            <a:avLst/>
-          </a:prstGeom>
-          <a:solidFill>
-            <a:schemeClr val="bg1"/>
-          </a:solidFill>
-          <a:ln w="9525">
-            <a:solidFill>
-              <a:schemeClr val="bg1"/>
-            </a:solidFill>
-          </a:ln>
-          <a:effectLst>
-            <a:glow rad="139700">
-              <a:schemeClr val="accent3">
-                <a:satMod val="175000"/>
-                <a:alpha val="40000"/>
-              </a:schemeClr>
-            </a:glow>
-          </a:effectLst>
-        </p:spPr>
-        <p:style>
-          <a:lnRef idx="2">
-            <a:schemeClr val="accent1">
-              <a:shade val="50000"/>
-            </a:schemeClr>
-          </a:lnRef>
-          <a:fillRef idx="1">
-            <a:schemeClr val="accent1"/>
-          </a:fillRef>
-          <a:effectRef idx="0">
-            <a:schemeClr val="accent1"/>
-          </a:effectRef>
-          <a:fontRef idx="minor">
-            <a:schemeClr val="lt1"/>
-          </a:fontRef>
-        </p:style>
-        <p:txBody>
-          <a:bodyPr rtlCol="0" anchor="ctr"/>
-          <a:lstStyle/>
-          <a:p>
-            <a:pPr algn="ctr"/>
-            <a:endParaRPr lang="es-419" sz="402" dirty="0"/>
-          </a:p>
-        </p:txBody>
-      </p:sp>
-    </p:spTree>
-    <p:extLst>
-      <p:ext uri="{BB962C8B-B14F-4D97-AF65-F5344CB8AC3E}">
-        <p14:creationId xmlns:p14="http://schemas.microsoft.com/office/powerpoint/2010/main" val="3504251319"/>
       </p:ext>
     </p:extLst>
   </p:cSld>
@@ -5675,519 +5675,6 @@
           <p:cNvPr id="2" name="Groupe 1">
             <a:extLst>
               <a:ext uri="{FF2B5EF4-FFF2-40B4-BE49-F238E27FC236}">
-                <a16:creationId xmlns:a16="http://schemas.microsoft.com/office/drawing/2014/main" id="{A656D2AD-16FC-4215-9D83-9A3ACD51899E}"/>
-              </a:ext>
-            </a:extLst>
-          </p:cNvPr>
-          <p:cNvGrpSpPr/>
-          <p:nvPr/>
-        </p:nvGrpSpPr>
-        <p:grpSpPr>
-          <a:xfrm>
-            <a:off x="4068903" y="720000"/>
-            <a:ext cx="360000" cy="360000"/>
-            <a:chOff x="751840" y="670560"/>
-            <a:chExt cx="720000" cy="720000"/>
-          </a:xfrm>
-          <a:solidFill>
-            <a:srgbClr val="7030A0"/>
-          </a:solidFill>
-        </p:grpSpPr>
-        <p:sp>
-          <p:nvSpPr>
-            <p:cNvPr id="3" name="Rectangle 2">
-              <a:extLst>
-                <a:ext uri="{FF2B5EF4-FFF2-40B4-BE49-F238E27FC236}">
-                  <a16:creationId xmlns:a16="http://schemas.microsoft.com/office/drawing/2014/main" id="{DB1F4429-9EEE-49FB-BCAE-1576B6ECD610}"/>
-                </a:ext>
-              </a:extLst>
-            </p:cNvPr>
-            <p:cNvSpPr/>
-            <p:nvPr/>
-          </p:nvSpPr>
-          <p:spPr>
-            <a:xfrm>
-              <a:off x="751840" y="670560"/>
-              <a:ext cx="720000" cy="720000"/>
-            </a:xfrm>
-            <a:prstGeom prst="rect">
-              <a:avLst/>
-            </a:prstGeom>
-            <a:grpFill/>
-            <a:ln w="9525"/>
-          </p:spPr>
-          <p:style>
-            <a:lnRef idx="2">
-              <a:schemeClr val="accent1">
-                <a:shade val="50000"/>
-              </a:schemeClr>
-            </a:lnRef>
-            <a:fillRef idx="1">
-              <a:schemeClr val="accent1"/>
-            </a:fillRef>
-            <a:effectRef idx="0">
-              <a:schemeClr val="accent1"/>
-            </a:effectRef>
-            <a:fontRef idx="minor">
-              <a:schemeClr val="lt1"/>
-            </a:fontRef>
-          </p:style>
-          <p:txBody>
-            <a:bodyPr rtlCol="0" anchor="ctr"/>
-            <a:lstStyle/>
-            <a:p>
-              <a:pPr algn="ctr"/>
-              <a:endParaRPr lang="es-419" sz="402" dirty="0"/>
-            </a:p>
-          </p:txBody>
-        </p:sp>
-        <p:cxnSp>
-          <p:nvCxnSpPr>
-            <p:cNvPr id="4" name="Connecteur droit 3">
-              <a:extLst>
-                <a:ext uri="{FF2B5EF4-FFF2-40B4-BE49-F238E27FC236}">
-                  <a16:creationId xmlns:a16="http://schemas.microsoft.com/office/drawing/2014/main" id="{42DF4582-CB18-4028-895E-57E0623AE9D5}"/>
-                </a:ext>
-              </a:extLst>
-            </p:cNvPr>
-            <p:cNvCxnSpPr/>
-            <p:nvPr/>
-          </p:nvCxnSpPr>
-          <p:spPr>
-            <a:xfrm>
-              <a:off x="751840" y="670560"/>
-              <a:ext cx="720000" cy="720000"/>
-            </a:xfrm>
-            <a:prstGeom prst="line">
-              <a:avLst/>
-            </a:prstGeom>
-            <a:grpFill/>
-            <a:ln w="9525">
-              <a:solidFill>
-                <a:schemeClr val="bg1"/>
-              </a:solidFill>
-            </a:ln>
-          </p:spPr>
-          <p:style>
-            <a:lnRef idx="1">
-              <a:schemeClr val="accent1"/>
-            </a:lnRef>
-            <a:fillRef idx="0">
-              <a:schemeClr val="accent1"/>
-            </a:fillRef>
-            <a:effectRef idx="0">
-              <a:schemeClr val="accent1"/>
-            </a:effectRef>
-            <a:fontRef idx="minor">
-              <a:schemeClr val="tx1"/>
-            </a:fontRef>
-          </p:style>
-        </p:cxnSp>
-        <p:cxnSp>
-          <p:nvCxnSpPr>
-            <p:cNvPr id="5" name="Connecteur droit 4">
-              <a:extLst>
-                <a:ext uri="{FF2B5EF4-FFF2-40B4-BE49-F238E27FC236}">
-                  <a16:creationId xmlns:a16="http://schemas.microsoft.com/office/drawing/2014/main" id="{F7285143-9141-429A-8D3D-24277D6A3BA8}"/>
-                </a:ext>
-              </a:extLst>
-            </p:cNvPr>
-            <p:cNvCxnSpPr>
-              <a:cxnSpLocks/>
-            </p:cNvCxnSpPr>
-            <p:nvPr/>
-          </p:nvCxnSpPr>
-          <p:spPr>
-            <a:xfrm flipH="1">
-              <a:off x="751840" y="670560"/>
-              <a:ext cx="720000" cy="720000"/>
-            </a:xfrm>
-            <a:prstGeom prst="line">
-              <a:avLst/>
-            </a:prstGeom>
-            <a:grpFill/>
-            <a:ln w="9525">
-              <a:solidFill>
-                <a:schemeClr val="bg1"/>
-              </a:solidFill>
-            </a:ln>
-          </p:spPr>
-          <p:style>
-            <a:lnRef idx="1">
-              <a:schemeClr val="accent1"/>
-            </a:lnRef>
-            <a:fillRef idx="0">
-              <a:schemeClr val="accent1"/>
-            </a:fillRef>
-            <a:effectRef idx="0">
-              <a:schemeClr val="accent1"/>
-            </a:effectRef>
-            <a:fontRef idx="minor">
-              <a:schemeClr val="tx1"/>
-            </a:fontRef>
-          </p:style>
-        </p:cxnSp>
-      </p:grpSp>
-      <p:sp>
-        <p:nvSpPr>
-          <p:cNvPr id="6" name="Ellipse 5">
-            <a:extLst>
-              <a:ext uri="{FF2B5EF4-FFF2-40B4-BE49-F238E27FC236}">
-                <a16:creationId xmlns:a16="http://schemas.microsoft.com/office/drawing/2014/main" id="{894C64B4-48DF-426B-937A-806C2C424500}"/>
-              </a:ext>
-            </a:extLst>
-          </p:cNvPr>
-          <p:cNvSpPr/>
-          <p:nvPr/>
-        </p:nvSpPr>
-        <p:spPr>
-          <a:xfrm>
-            <a:off x="4230903" y="882000"/>
-            <a:ext cx="36000" cy="36000"/>
-          </a:xfrm>
-          <a:prstGeom prst="ellipse">
-            <a:avLst/>
-          </a:prstGeom>
-          <a:solidFill>
-            <a:schemeClr val="bg1"/>
-          </a:solidFill>
-          <a:ln w="9525">
-            <a:solidFill>
-              <a:schemeClr val="bg1"/>
-            </a:solidFill>
-          </a:ln>
-          <a:effectLst>
-            <a:glow rad="139700">
-              <a:schemeClr val="accent3">
-                <a:satMod val="175000"/>
-                <a:alpha val="40000"/>
-              </a:schemeClr>
-            </a:glow>
-          </a:effectLst>
-        </p:spPr>
-        <p:style>
-          <a:lnRef idx="2">
-            <a:schemeClr val="accent1">
-              <a:shade val="50000"/>
-            </a:schemeClr>
-          </a:lnRef>
-          <a:fillRef idx="1">
-            <a:schemeClr val="accent1"/>
-          </a:fillRef>
-          <a:effectRef idx="0">
-            <a:schemeClr val="accent1"/>
-          </a:effectRef>
-          <a:fontRef idx="minor">
-            <a:schemeClr val="lt1"/>
-          </a:fontRef>
-        </p:style>
-        <p:txBody>
-          <a:bodyPr rtlCol="0" anchor="ctr"/>
-          <a:lstStyle/>
-          <a:p>
-            <a:pPr algn="ctr"/>
-            <a:endParaRPr lang="es-419" sz="402" dirty="0"/>
-          </a:p>
-        </p:txBody>
-      </p:sp>
-    </p:spTree>
-    <p:extLst>
-      <p:ext uri="{BB962C8B-B14F-4D97-AF65-F5344CB8AC3E}">
-        <p14:creationId xmlns:p14="http://schemas.microsoft.com/office/powerpoint/2010/main" val="59185921"/>
-      </p:ext>
-    </p:extLst>
-  </p:cSld>
-  <p:clrMapOvr>
-    <a:masterClrMapping/>
-  </p:clrMapOvr>
-  <mc:AlternateContent xmlns:mc="http://schemas.openxmlformats.org/markup-compatibility/2006" xmlns:p14="http://schemas.microsoft.com/office/powerpoint/2010/main">
-    <mc:Choice Requires="p14">
-      <p:transition spd="slow" p14:dur="2000" advClick="0" advTm="2000"/>
-    </mc:Choice>
-    <mc:Fallback xmlns="">
-      <p:transition spd="slow" advClick="0" advTm="2000"/>
-    </mc:Fallback>
-  </mc:AlternateContent>
-</p:sld>
-</file>
-
-<file path=ppt/slides/slide2.xml><?xml version="1.0" encoding="utf-8"?>
-<p:sld xmlns:a="http://schemas.openxmlformats.org/drawingml/2006/main" xmlns:r="http://schemas.openxmlformats.org/officeDocument/2006/relationships" xmlns:p="http://schemas.openxmlformats.org/presentationml/2006/main">
-  <p:cSld>
-    <p:spTree>
-      <p:nvGrpSpPr>
-        <p:cNvPr id="1" name=""/>
-        <p:cNvGrpSpPr/>
-        <p:nvPr/>
-      </p:nvGrpSpPr>
-      <p:grpSpPr>
-        <a:xfrm>
-          <a:off x="0" y="0"/>
-          <a:ext cx="0" cy="0"/>
-          <a:chOff x="0" y="0"/>
-          <a:chExt cx="0" cy="0"/>
-        </a:xfrm>
-      </p:grpSpPr>
-      <p:grpSp>
-        <p:nvGrpSpPr>
-          <p:cNvPr id="4" name="Groupe 3">
-            <a:extLst>
-              <a:ext uri="{FF2B5EF4-FFF2-40B4-BE49-F238E27FC236}">
-                <a16:creationId xmlns:a16="http://schemas.microsoft.com/office/drawing/2014/main" id="{A677340D-9883-468E-8A99-2798519B8EDA}"/>
-              </a:ext>
-            </a:extLst>
-          </p:cNvPr>
-          <p:cNvGrpSpPr/>
-          <p:nvPr/>
-        </p:nvGrpSpPr>
-        <p:grpSpPr>
-          <a:xfrm>
-            <a:off x="5399450" y="198"/>
-            <a:ext cx="360000" cy="360000"/>
-            <a:chOff x="751840" y="670560"/>
-            <a:chExt cx="720000" cy="720000"/>
-          </a:xfrm>
-        </p:grpSpPr>
-        <p:sp>
-          <p:nvSpPr>
-            <p:cNvPr id="5" name="Rectangle 4">
-              <a:extLst>
-                <a:ext uri="{FF2B5EF4-FFF2-40B4-BE49-F238E27FC236}">
-                  <a16:creationId xmlns:a16="http://schemas.microsoft.com/office/drawing/2014/main" id="{77FD1D4F-6BD0-4BF4-83B0-ACF7F1E21871}"/>
-                </a:ext>
-              </a:extLst>
-            </p:cNvPr>
-            <p:cNvSpPr/>
-            <p:nvPr/>
-          </p:nvSpPr>
-          <p:spPr>
-            <a:xfrm>
-              <a:off x="751840" y="670560"/>
-              <a:ext cx="720000" cy="720000"/>
-            </a:xfrm>
-            <a:prstGeom prst="rect">
-              <a:avLst/>
-            </a:prstGeom>
-            <a:solidFill>
-              <a:schemeClr val="accent1"/>
-            </a:solidFill>
-            <a:ln w="9525"/>
-          </p:spPr>
-          <p:style>
-            <a:lnRef idx="2">
-              <a:schemeClr val="accent1">
-                <a:shade val="50000"/>
-              </a:schemeClr>
-            </a:lnRef>
-            <a:fillRef idx="1">
-              <a:schemeClr val="accent1"/>
-            </a:fillRef>
-            <a:effectRef idx="0">
-              <a:schemeClr val="accent1"/>
-            </a:effectRef>
-            <a:fontRef idx="minor">
-              <a:schemeClr val="lt1"/>
-            </a:fontRef>
-          </p:style>
-          <p:txBody>
-            <a:bodyPr rtlCol="0" anchor="ctr"/>
-            <a:lstStyle/>
-            <a:p>
-              <a:pPr algn="ctr"/>
-              <a:endParaRPr lang="es-419" sz="402" dirty="0"/>
-            </a:p>
-          </p:txBody>
-        </p:sp>
-        <p:cxnSp>
-          <p:nvCxnSpPr>
-            <p:cNvPr id="6" name="Connecteur droit 5">
-              <a:extLst>
-                <a:ext uri="{FF2B5EF4-FFF2-40B4-BE49-F238E27FC236}">
-                  <a16:creationId xmlns:a16="http://schemas.microsoft.com/office/drawing/2014/main" id="{866EE649-B965-487F-B745-B7CF988EC291}"/>
-                </a:ext>
-              </a:extLst>
-            </p:cNvPr>
-            <p:cNvCxnSpPr/>
-            <p:nvPr/>
-          </p:nvCxnSpPr>
-          <p:spPr>
-            <a:xfrm>
-              <a:off x="751840" y="670560"/>
-              <a:ext cx="720000" cy="720000"/>
-            </a:xfrm>
-            <a:prstGeom prst="line">
-              <a:avLst/>
-            </a:prstGeom>
-            <a:ln w="9525">
-              <a:solidFill>
-                <a:schemeClr val="bg1"/>
-              </a:solidFill>
-            </a:ln>
-          </p:spPr>
-          <p:style>
-            <a:lnRef idx="1">
-              <a:schemeClr val="accent1"/>
-            </a:lnRef>
-            <a:fillRef idx="0">
-              <a:schemeClr val="accent1"/>
-            </a:fillRef>
-            <a:effectRef idx="0">
-              <a:schemeClr val="accent1"/>
-            </a:effectRef>
-            <a:fontRef idx="minor">
-              <a:schemeClr val="tx1"/>
-            </a:fontRef>
-          </p:style>
-        </p:cxnSp>
-        <p:cxnSp>
-          <p:nvCxnSpPr>
-            <p:cNvPr id="7" name="Connecteur droit 6">
-              <a:extLst>
-                <a:ext uri="{FF2B5EF4-FFF2-40B4-BE49-F238E27FC236}">
-                  <a16:creationId xmlns:a16="http://schemas.microsoft.com/office/drawing/2014/main" id="{5A2DE221-7F58-467D-9CA4-75798F41574B}"/>
-                </a:ext>
-              </a:extLst>
-            </p:cNvPr>
-            <p:cNvCxnSpPr>
-              <a:cxnSpLocks/>
-            </p:cNvCxnSpPr>
-            <p:nvPr/>
-          </p:nvCxnSpPr>
-          <p:spPr>
-            <a:xfrm flipH="1">
-              <a:off x="751840" y="670560"/>
-              <a:ext cx="720000" cy="720000"/>
-            </a:xfrm>
-            <a:prstGeom prst="line">
-              <a:avLst/>
-            </a:prstGeom>
-            <a:ln w="9525">
-              <a:solidFill>
-                <a:schemeClr val="bg1"/>
-              </a:solidFill>
-            </a:ln>
-          </p:spPr>
-          <p:style>
-            <a:lnRef idx="1">
-              <a:schemeClr val="accent1"/>
-            </a:lnRef>
-            <a:fillRef idx="0">
-              <a:schemeClr val="accent1"/>
-            </a:fillRef>
-            <a:effectRef idx="0">
-              <a:schemeClr val="accent1"/>
-            </a:effectRef>
-            <a:fontRef idx="minor">
-              <a:schemeClr val="tx1"/>
-            </a:fontRef>
-          </p:style>
-        </p:cxnSp>
-      </p:grpSp>
-      <p:sp>
-        <p:nvSpPr>
-          <p:cNvPr id="8" name="Ellipse 7">
-            <a:extLst>
-              <a:ext uri="{FF2B5EF4-FFF2-40B4-BE49-F238E27FC236}">
-                <a16:creationId xmlns:a16="http://schemas.microsoft.com/office/drawing/2014/main" id="{9EFB738B-39DC-43FB-A427-51CF94B5A2D9}"/>
-              </a:ext>
-            </a:extLst>
-          </p:cNvPr>
-          <p:cNvSpPr/>
-          <p:nvPr/>
-        </p:nvSpPr>
-        <p:spPr>
-          <a:xfrm>
-            <a:off x="5561450" y="162198"/>
-            <a:ext cx="36000" cy="36000"/>
-          </a:xfrm>
-          <a:prstGeom prst="ellipse">
-            <a:avLst/>
-          </a:prstGeom>
-          <a:solidFill>
-            <a:schemeClr val="bg1"/>
-          </a:solidFill>
-          <a:ln w="9525">
-            <a:solidFill>
-              <a:schemeClr val="bg1"/>
-            </a:solidFill>
-          </a:ln>
-          <a:effectLst>
-            <a:glow rad="139700">
-              <a:schemeClr val="accent3">
-                <a:satMod val="175000"/>
-                <a:alpha val="40000"/>
-              </a:schemeClr>
-            </a:glow>
-          </a:effectLst>
-        </p:spPr>
-        <p:style>
-          <a:lnRef idx="2">
-            <a:schemeClr val="accent1">
-              <a:shade val="50000"/>
-            </a:schemeClr>
-          </a:lnRef>
-          <a:fillRef idx="1">
-            <a:schemeClr val="accent1"/>
-          </a:fillRef>
-          <a:effectRef idx="0">
-            <a:schemeClr val="accent1"/>
-          </a:effectRef>
-          <a:fontRef idx="minor">
-            <a:schemeClr val="lt1"/>
-          </a:fontRef>
-        </p:style>
-        <p:txBody>
-          <a:bodyPr rtlCol="0" anchor="ctr"/>
-          <a:lstStyle/>
-          <a:p>
-            <a:pPr algn="ctr"/>
-            <a:endParaRPr lang="es-419" sz="402" dirty="0"/>
-          </a:p>
-        </p:txBody>
-      </p:sp>
-    </p:spTree>
-    <p:extLst>
-      <p:ext uri="{BB962C8B-B14F-4D97-AF65-F5344CB8AC3E}">
-        <p14:creationId xmlns:p14="http://schemas.microsoft.com/office/powerpoint/2010/main" val="3336002141"/>
-      </p:ext>
-    </p:extLst>
-  </p:cSld>
-  <p:clrMapOvr>
-    <a:masterClrMapping/>
-  </p:clrMapOvr>
-  <mc:AlternateContent xmlns:mc="http://schemas.openxmlformats.org/markup-compatibility/2006" xmlns:p14="http://schemas.microsoft.com/office/powerpoint/2010/main">
-    <mc:Choice Requires="p14">
-      <p:transition spd="slow" p14:dur="2000" advClick="0" advTm="2000"/>
-    </mc:Choice>
-    <mc:Fallback xmlns="">
-      <p:transition spd="slow" advClick="0" advTm="2000"/>
-    </mc:Fallback>
-  </mc:AlternateContent>
-</p:sld>
-</file>
-
-<file path=ppt/slides/slide20.xml><?xml version="1.0" encoding="utf-8"?>
-<p:sld xmlns:a="http://schemas.openxmlformats.org/drawingml/2006/main" xmlns:r="http://schemas.openxmlformats.org/officeDocument/2006/relationships" xmlns:p="http://schemas.openxmlformats.org/presentationml/2006/main">
-  <p:cSld>
-    <p:spTree>
-      <p:nvGrpSpPr>
-        <p:cNvPr id="1" name=""/>
-        <p:cNvGrpSpPr/>
-        <p:nvPr/>
-      </p:nvGrpSpPr>
-      <p:grpSpPr>
-        <a:xfrm>
-          <a:off x="0" y="0"/>
-          <a:ext cx="0" cy="0"/>
-          <a:chOff x="0" y="0"/>
-          <a:chExt cx="0" cy="0"/>
-        </a:xfrm>
-      </p:grpSpPr>
-      <p:grpSp>
-        <p:nvGrpSpPr>
-          <p:cNvPr id="2" name="Groupe 1">
-            <a:extLst>
-              <a:ext uri="{FF2B5EF4-FFF2-40B4-BE49-F238E27FC236}">
                 <a16:creationId xmlns:a16="http://schemas.microsoft.com/office/drawing/2014/main" id="{DFA11D43-7EA2-4F09-AA16-86C5BB99D925}"/>
               </a:ext>
             </a:extLst>
@@ -6424,7 +5911,262 @@
 </p:sld>
 </file>
 
-<file path=ppt/slides/slide21.xml><?xml version="1.0" encoding="utf-8"?>
+<file path=ppt/slides/slide2.xml><?xml version="1.0" encoding="utf-8"?>
+<p:sld xmlns:a="http://schemas.openxmlformats.org/drawingml/2006/main" xmlns:r="http://schemas.openxmlformats.org/officeDocument/2006/relationships" xmlns:p="http://schemas.openxmlformats.org/presentationml/2006/main">
+  <p:cSld>
+    <p:spTree>
+      <p:nvGrpSpPr>
+        <p:cNvPr id="1" name=""/>
+        <p:cNvGrpSpPr/>
+        <p:nvPr/>
+      </p:nvGrpSpPr>
+      <p:grpSpPr>
+        <a:xfrm>
+          <a:off x="0" y="0"/>
+          <a:ext cx="0" cy="0"/>
+          <a:chOff x="0" y="0"/>
+          <a:chExt cx="0" cy="0"/>
+        </a:xfrm>
+      </p:grpSpPr>
+      <p:grpSp>
+        <p:nvGrpSpPr>
+          <p:cNvPr id="2" name="Groupe 1">
+            <a:extLst>
+              <a:ext uri="{FF2B5EF4-FFF2-40B4-BE49-F238E27FC236}">
+                <a16:creationId xmlns:a16="http://schemas.microsoft.com/office/drawing/2014/main" id="{47BF7579-A4CD-4F59-B028-2F2B692BEE77}"/>
+              </a:ext>
+            </a:extLst>
+          </p:cNvPr>
+          <p:cNvGrpSpPr/>
+          <p:nvPr/>
+        </p:nvGrpSpPr>
+        <p:grpSpPr>
+          <a:xfrm>
+            <a:off x="5399450" y="2879890"/>
+            <a:ext cx="360000" cy="360000"/>
+            <a:chOff x="751840" y="670560"/>
+            <a:chExt cx="720000" cy="720000"/>
+          </a:xfrm>
+        </p:grpSpPr>
+        <p:sp>
+          <p:nvSpPr>
+            <p:cNvPr id="3" name="Rectangle 2">
+              <a:extLst>
+                <a:ext uri="{FF2B5EF4-FFF2-40B4-BE49-F238E27FC236}">
+                  <a16:creationId xmlns:a16="http://schemas.microsoft.com/office/drawing/2014/main" id="{E0F33B7F-C673-467C-8610-C8ACA3204BC9}"/>
+                </a:ext>
+              </a:extLst>
+            </p:cNvPr>
+            <p:cNvSpPr/>
+            <p:nvPr/>
+          </p:nvSpPr>
+          <p:spPr>
+            <a:xfrm>
+              <a:off x="751840" y="670560"/>
+              <a:ext cx="720000" cy="720000"/>
+            </a:xfrm>
+            <a:prstGeom prst="rect">
+              <a:avLst/>
+            </a:prstGeom>
+            <a:solidFill>
+              <a:schemeClr val="accent1"/>
+            </a:solidFill>
+            <a:ln w="9525"/>
+          </p:spPr>
+          <p:style>
+            <a:lnRef idx="2">
+              <a:schemeClr val="accent1">
+                <a:shade val="50000"/>
+              </a:schemeClr>
+            </a:lnRef>
+            <a:fillRef idx="1">
+              <a:schemeClr val="accent1"/>
+            </a:fillRef>
+            <a:effectRef idx="0">
+              <a:schemeClr val="accent1"/>
+            </a:effectRef>
+            <a:fontRef idx="minor">
+              <a:schemeClr val="lt1"/>
+            </a:fontRef>
+          </p:style>
+          <p:txBody>
+            <a:bodyPr rtlCol="0" anchor="ctr"/>
+            <a:lstStyle/>
+            <a:p>
+              <a:pPr algn="ctr"/>
+              <a:endParaRPr lang="es-419" sz="402" dirty="0"/>
+            </a:p>
+          </p:txBody>
+        </p:sp>
+        <p:cxnSp>
+          <p:nvCxnSpPr>
+            <p:cNvPr id="4" name="Connecteur droit 3">
+              <a:extLst>
+                <a:ext uri="{FF2B5EF4-FFF2-40B4-BE49-F238E27FC236}">
+                  <a16:creationId xmlns:a16="http://schemas.microsoft.com/office/drawing/2014/main" id="{9939A0F8-EB8E-4DAF-BF0B-01E37AF33C9D}"/>
+                </a:ext>
+              </a:extLst>
+            </p:cNvPr>
+            <p:cNvCxnSpPr/>
+            <p:nvPr/>
+          </p:nvCxnSpPr>
+          <p:spPr>
+            <a:xfrm>
+              <a:off x="751840" y="670560"/>
+              <a:ext cx="720000" cy="720000"/>
+            </a:xfrm>
+            <a:prstGeom prst="line">
+              <a:avLst/>
+            </a:prstGeom>
+            <a:ln w="9525">
+              <a:solidFill>
+                <a:schemeClr val="bg1"/>
+              </a:solidFill>
+            </a:ln>
+          </p:spPr>
+          <p:style>
+            <a:lnRef idx="1">
+              <a:schemeClr val="accent1"/>
+            </a:lnRef>
+            <a:fillRef idx="0">
+              <a:schemeClr val="accent1"/>
+            </a:fillRef>
+            <a:effectRef idx="0">
+              <a:schemeClr val="accent1"/>
+            </a:effectRef>
+            <a:fontRef idx="minor">
+              <a:schemeClr val="tx1"/>
+            </a:fontRef>
+          </p:style>
+        </p:cxnSp>
+        <p:cxnSp>
+          <p:nvCxnSpPr>
+            <p:cNvPr id="5" name="Connecteur droit 4">
+              <a:extLst>
+                <a:ext uri="{FF2B5EF4-FFF2-40B4-BE49-F238E27FC236}">
+                  <a16:creationId xmlns:a16="http://schemas.microsoft.com/office/drawing/2014/main" id="{290F657A-9E85-4845-9FC8-C41E0FA9F48F}"/>
+                </a:ext>
+              </a:extLst>
+            </p:cNvPr>
+            <p:cNvCxnSpPr>
+              <a:cxnSpLocks/>
+            </p:cNvCxnSpPr>
+            <p:nvPr/>
+          </p:nvCxnSpPr>
+          <p:spPr>
+            <a:xfrm flipH="1">
+              <a:off x="751840" y="670560"/>
+              <a:ext cx="720000" cy="720000"/>
+            </a:xfrm>
+            <a:prstGeom prst="line">
+              <a:avLst/>
+            </a:prstGeom>
+            <a:ln w="9525">
+              <a:solidFill>
+                <a:schemeClr val="bg1"/>
+              </a:solidFill>
+            </a:ln>
+          </p:spPr>
+          <p:style>
+            <a:lnRef idx="1">
+              <a:schemeClr val="accent1"/>
+            </a:lnRef>
+            <a:fillRef idx="0">
+              <a:schemeClr val="accent1"/>
+            </a:fillRef>
+            <a:effectRef idx="0">
+              <a:schemeClr val="accent1"/>
+            </a:effectRef>
+            <a:fontRef idx="minor">
+              <a:schemeClr val="tx1"/>
+            </a:fontRef>
+          </p:style>
+        </p:cxnSp>
+      </p:grpSp>
+      <p:sp>
+        <p:nvSpPr>
+          <p:cNvPr id="6" name="Ellipse 5">
+            <a:extLst>
+              <a:ext uri="{FF2B5EF4-FFF2-40B4-BE49-F238E27FC236}">
+                <a16:creationId xmlns:a16="http://schemas.microsoft.com/office/drawing/2014/main" id="{5637FC77-26B6-42D3-AFA0-8D2B206B7303}"/>
+              </a:ext>
+            </a:extLst>
+          </p:cNvPr>
+          <p:cNvSpPr/>
+          <p:nvPr/>
+        </p:nvSpPr>
+        <p:spPr>
+          <a:xfrm>
+            <a:off x="5561450" y="3041890"/>
+            <a:ext cx="36000" cy="36000"/>
+          </a:xfrm>
+          <a:prstGeom prst="ellipse">
+            <a:avLst/>
+          </a:prstGeom>
+          <a:solidFill>
+            <a:schemeClr val="bg1"/>
+          </a:solidFill>
+          <a:ln w="9525">
+            <a:solidFill>
+              <a:schemeClr val="bg1"/>
+            </a:solidFill>
+          </a:ln>
+          <a:effectLst>
+            <a:glow rad="139700">
+              <a:schemeClr val="accent3">
+                <a:satMod val="175000"/>
+                <a:alpha val="40000"/>
+              </a:schemeClr>
+            </a:glow>
+          </a:effectLst>
+        </p:spPr>
+        <p:style>
+          <a:lnRef idx="2">
+            <a:schemeClr val="accent1">
+              <a:shade val="50000"/>
+            </a:schemeClr>
+          </a:lnRef>
+          <a:fillRef idx="1">
+            <a:schemeClr val="accent1"/>
+          </a:fillRef>
+          <a:effectRef idx="0">
+            <a:schemeClr val="accent1"/>
+          </a:effectRef>
+          <a:fontRef idx="minor">
+            <a:schemeClr val="lt1"/>
+          </a:fontRef>
+        </p:style>
+        <p:txBody>
+          <a:bodyPr rtlCol="0" anchor="ctr"/>
+          <a:lstStyle/>
+          <a:p>
+            <a:pPr algn="ctr"/>
+            <a:endParaRPr lang="es-419" sz="402" dirty="0"/>
+          </a:p>
+        </p:txBody>
+      </p:sp>
+    </p:spTree>
+    <p:extLst>
+      <p:ext uri="{BB962C8B-B14F-4D97-AF65-F5344CB8AC3E}">
+        <p14:creationId xmlns:p14="http://schemas.microsoft.com/office/powerpoint/2010/main" val="4209917558"/>
+      </p:ext>
+    </p:extLst>
+  </p:cSld>
+  <p:clrMapOvr>
+    <a:masterClrMapping/>
+  </p:clrMapOvr>
+  <mc:AlternateContent xmlns:mc="http://schemas.openxmlformats.org/markup-compatibility/2006" xmlns:p14="http://schemas.microsoft.com/office/powerpoint/2010/main">
+    <mc:Choice Requires="p14">
+      <p:transition spd="slow" p14:dur="2000" advClick="0" advTm="2000"/>
+    </mc:Choice>
+    <mc:Fallback xmlns="">
+      <p:transition spd="slow" advClick="0" advTm="2000"/>
+    </mc:Fallback>
+  </mc:AlternateContent>
+</p:sld>
+</file>
+
+<file path=ppt/slides/slide20.xml><?xml version="1.0" encoding="utf-8"?>
 <p:sld xmlns:a="http://schemas.openxmlformats.org/drawingml/2006/main" xmlns:r="http://schemas.openxmlformats.org/officeDocument/2006/relationships" xmlns:p="http://schemas.openxmlformats.org/presentationml/2006/main">
   <p:cSld>
     <p:spTree>
@@ -6682,7 +6424,781 @@
 </p:sld>
 </file>
 
+<file path=ppt/slides/slide21.xml><?xml version="1.0" encoding="utf-8"?>
+<p:sld xmlns:a="http://schemas.openxmlformats.org/drawingml/2006/main" xmlns:r="http://schemas.openxmlformats.org/officeDocument/2006/relationships" xmlns:p="http://schemas.openxmlformats.org/presentationml/2006/main">
+  <p:cSld>
+    <p:spTree>
+      <p:nvGrpSpPr>
+        <p:cNvPr id="1" name=""/>
+        <p:cNvGrpSpPr/>
+        <p:nvPr/>
+      </p:nvGrpSpPr>
+      <p:grpSpPr>
+        <a:xfrm>
+          <a:off x="0" y="0"/>
+          <a:ext cx="0" cy="0"/>
+          <a:chOff x="0" y="0"/>
+          <a:chExt cx="0" cy="0"/>
+        </a:xfrm>
+      </p:grpSpPr>
+      <p:grpSp>
+        <p:nvGrpSpPr>
+          <p:cNvPr id="2" name="Groupe 1">
+            <a:extLst>
+              <a:ext uri="{FF2B5EF4-FFF2-40B4-BE49-F238E27FC236}">
+                <a16:creationId xmlns:a16="http://schemas.microsoft.com/office/drawing/2014/main" id="{A656D2AD-16FC-4215-9D83-9A3ACD51899E}"/>
+              </a:ext>
+            </a:extLst>
+          </p:cNvPr>
+          <p:cNvGrpSpPr/>
+          <p:nvPr/>
+        </p:nvGrpSpPr>
+        <p:grpSpPr>
+          <a:xfrm>
+            <a:off x="4068903" y="720000"/>
+            <a:ext cx="360000" cy="360000"/>
+            <a:chOff x="751840" y="670560"/>
+            <a:chExt cx="720000" cy="720000"/>
+          </a:xfrm>
+          <a:solidFill>
+            <a:srgbClr val="7030A0"/>
+          </a:solidFill>
+        </p:grpSpPr>
+        <p:sp>
+          <p:nvSpPr>
+            <p:cNvPr id="3" name="Rectangle 2">
+              <a:extLst>
+                <a:ext uri="{FF2B5EF4-FFF2-40B4-BE49-F238E27FC236}">
+                  <a16:creationId xmlns:a16="http://schemas.microsoft.com/office/drawing/2014/main" id="{DB1F4429-9EEE-49FB-BCAE-1576B6ECD610}"/>
+                </a:ext>
+              </a:extLst>
+            </p:cNvPr>
+            <p:cNvSpPr/>
+            <p:nvPr/>
+          </p:nvSpPr>
+          <p:spPr>
+            <a:xfrm>
+              <a:off x="751840" y="670560"/>
+              <a:ext cx="720000" cy="720000"/>
+            </a:xfrm>
+            <a:prstGeom prst="rect">
+              <a:avLst/>
+            </a:prstGeom>
+            <a:grpFill/>
+            <a:ln w="9525"/>
+          </p:spPr>
+          <p:style>
+            <a:lnRef idx="2">
+              <a:schemeClr val="accent1">
+                <a:shade val="50000"/>
+              </a:schemeClr>
+            </a:lnRef>
+            <a:fillRef idx="1">
+              <a:schemeClr val="accent1"/>
+            </a:fillRef>
+            <a:effectRef idx="0">
+              <a:schemeClr val="accent1"/>
+            </a:effectRef>
+            <a:fontRef idx="minor">
+              <a:schemeClr val="lt1"/>
+            </a:fontRef>
+          </p:style>
+          <p:txBody>
+            <a:bodyPr rtlCol="0" anchor="ctr"/>
+            <a:lstStyle/>
+            <a:p>
+              <a:pPr algn="ctr"/>
+              <a:endParaRPr lang="es-419" sz="402" dirty="0"/>
+            </a:p>
+          </p:txBody>
+        </p:sp>
+        <p:cxnSp>
+          <p:nvCxnSpPr>
+            <p:cNvPr id="4" name="Connecteur droit 3">
+              <a:extLst>
+                <a:ext uri="{FF2B5EF4-FFF2-40B4-BE49-F238E27FC236}">
+                  <a16:creationId xmlns:a16="http://schemas.microsoft.com/office/drawing/2014/main" id="{42DF4582-CB18-4028-895E-57E0623AE9D5}"/>
+                </a:ext>
+              </a:extLst>
+            </p:cNvPr>
+            <p:cNvCxnSpPr/>
+            <p:nvPr/>
+          </p:nvCxnSpPr>
+          <p:spPr>
+            <a:xfrm>
+              <a:off x="751840" y="670560"/>
+              <a:ext cx="720000" cy="720000"/>
+            </a:xfrm>
+            <a:prstGeom prst="line">
+              <a:avLst/>
+            </a:prstGeom>
+            <a:grpFill/>
+            <a:ln w="9525">
+              <a:solidFill>
+                <a:schemeClr val="bg1"/>
+              </a:solidFill>
+            </a:ln>
+          </p:spPr>
+          <p:style>
+            <a:lnRef idx="1">
+              <a:schemeClr val="accent1"/>
+            </a:lnRef>
+            <a:fillRef idx="0">
+              <a:schemeClr val="accent1"/>
+            </a:fillRef>
+            <a:effectRef idx="0">
+              <a:schemeClr val="accent1"/>
+            </a:effectRef>
+            <a:fontRef idx="minor">
+              <a:schemeClr val="tx1"/>
+            </a:fontRef>
+          </p:style>
+        </p:cxnSp>
+        <p:cxnSp>
+          <p:nvCxnSpPr>
+            <p:cNvPr id="5" name="Connecteur droit 4">
+              <a:extLst>
+                <a:ext uri="{FF2B5EF4-FFF2-40B4-BE49-F238E27FC236}">
+                  <a16:creationId xmlns:a16="http://schemas.microsoft.com/office/drawing/2014/main" id="{F7285143-9141-429A-8D3D-24277D6A3BA8}"/>
+                </a:ext>
+              </a:extLst>
+            </p:cNvPr>
+            <p:cNvCxnSpPr>
+              <a:cxnSpLocks/>
+            </p:cNvCxnSpPr>
+            <p:nvPr/>
+          </p:nvCxnSpPr>
+          <p:spPr>
+            <a:xfrm flipH="1">
+              <a:off x="751840" y="670560"/>
+              <a:ext cx="720000" cy="720000"/>
+            </a:xfrm>
+            <a:prstGeom prst="line">
+              <a:avLst/>
+            </a:prstGeom>
+            <a:grpFill/>
+            <a:ln w="9525">
+              <a:solidFill>
+                <a:schemeClr val="bg1"/>
+              </a:solidFill>
+            </a:ln>
+          </p:spPr>
+          <p:style>
+            <a:lnRef idx="1">
+              <a:schemeClr val="accent1"/>
+            </a:lnRef>
+            <a:fillRef idx="0">
+              <a:schemeClr val="accent1"/>
+            </a:fillRef>
+            <a:effectRef idx="0">
+              <a:schemeClr val="accent1"/>
+            </a:effectRef>
+            <a:fontRef idx="minor">
+              <a:schemeClr val="tx1"/>
+            </a:fontRef>
+          </p:style>
+        </p:cxnSp>
+      </p:grpSp>
+      <p:sp>
+        <p:nvSpPr>
+          <p:cNvPr id="6" name="Ellipse 5">
+            <a:extLst>
+              <a:ext uri="{FF2B5EF4-FFF2-40B4-BE49-F238E27FC236}">
+                <a16:creationId xmlns:a16="http://schemas.microsoft.com/office/drawing/2014/main" id="{894C64B4-48DF-426B-937A-806C2C424500}"/>
+              </a:ext>
+            </a:extLst>
+          </p:cNvPr>
+          <p:cNvSpPr/>
+          <p:nvPr/>
+        </p:nvSpPr>
+        <p:spPr>
+          <a:xfrm>
+            <a:off x="4230903" y="882000"/>
+            <a:ext cx="36000" cy="36000"/>
+          </a:xfrm>
+          <a:prstGeom prst="ellipse">
+            <a:avLst/>
+          </a:prstGeom>
+          <a:solidFill>
+            <a:schemeClr val="bg1"/>
+          </a:solidFill>
+          <a:ln w="9525">
+            <a:solidFill>
+              <a:schemeClr val="bg1"/>
+            </a:solidFill>
+          </a:ln>
+          <a:effectLst>
+            <a:glow rad="139700">
+              <a:schemeClr val="accent3">
+                <a:satMod val="175000"/>
+                <a:alpha val="40000"/>
+              </a:schemeClr>
+            </a:glow>
+          </a:effectLst>
+        </p:spPr>
+        <p:style>
+          <a:lnRef idx="2">
+            <a:schemeClr val="accent1">
+              <a:shade val="50000"/>
+            </a:schemeClr>
+          </a:lnRef>
+          <a:fillRef idx="1">
+            <a:schemeClr val="accent1"/>
+          </a:fillRef>
+          <a:effectRef idx="0">
+            <a:schemeClr val="accent1"/>
+          </a:effectRef>
+          <a:fontRef idx="minor">
+            <a:schemeClr val="lt1"/>
+          </a:fontRef>
+        </p:style>
+        <p:txBody>
+          <a:bodyPr rtlCol="0" anchor="ctr"/>
+          <a:lstStyle/>
+          <a:p>
+            <a:pPr algn="ctr"/>
+            <a:endParaRPr lang="es-419" sz="402" dirty="0"/>
+          </a:p>
+        </p:txBody>
+      </p:sp>
+    </p:spTree>
+    <p:extLst>
+      <p:ext uri="{BB962C8B-B14F-4D97-AF65-F5344CB8AC3E}">
+        <p14:creationId xmlns:p14="http://schemas.microsoft.com/office/powerpoint/2010/main" val="59185921"/>
+      </p:ext>
+    </p:extLst>
+  </p:cSld>
+  <p:clrMapOvr>
+    <a:masterClrMapping/>
+  </p:clrMapOvr>
+  <mc:AlternateContent xmlns:mc="http://schemas.openxmlformats.org/markup-compatibility/2006" xmlns:p14="http://schemas.microsoft.com/office/powerpoint/2010/main">
+    <mc:Choice Requires="p14">
+      <p:transition spd="slow" p14:dur="2000" advClick="0" advTm="2000"/>
+    </mc:Choice>
+    <mc:Fallback xmlns="">
+      <p:transition spd="slow" advClick="0" advTm="2000"/>
+    </mc:Fallback>
+  </mc:AlternateContent>
+</p:sld>
+</file>
+
 <file path=ppt/slides/slide22.xml><?xml version="1.0" encoding="utf-8"?>
+<p:sld xmlns:a="http://schemas.openxmlformats.org/drawingml/2006/main" xmlns:r="http://schemas.openxmlformats.org/officeDocument/2006/relationships" xmlns:p="http://schemas.openxmlformats.org/presentationml/2006/main">
+  <p:cSld>
+    <p:spTree>
+      <p:nvGrpSpPr>
+        <p:cNvPr id="1" name=""/>
+        <p:cNvGrpSpPr/>
+        <p:nvPr/>
+      </p:nvGrpSpPr>
+      <p:grpSpPr>
+        <a:xfrm>
+          <a:off x="0" y="0"/>
+          <a:ext cx="0" cy="0"/>
+          <a:chOff x="0" y="0"/>
+          <a:chExt cx="0" cy="0"/>
+        </a:xfrm>
+      </p:grpSpPr>
+      <p:grpSp>
+        <p:nvGrpSpPr>
+          <p:cNvPr id="2" name="Groupe 1">
+            <a:extLst>
+              <a:ext uri="{FF2B5EF4-FFF2-40B4-BE49-F238E27FC236}">
+                <a16:creationId xmlns:a16="http://schemas.microsoft.com/office/drawing/2014/main" id="{561CE806-7FC7-4D78-A1D1-BC82D34AF293}"/>
+              </a:ext>
+            </a:extLst>
+          </p:cNvPr>
+          <p:cNvGrpSpPr/>
+          <p:nvPr/>
+        </p:nvGrpSpPr>
+        <p:grpSpPr>
+          <a:xfrm>
+            <a:off x="2700000" y="2178000"/>
+            <a:ext cx="360000" cy="360000"/>
+            <a:chOff x="751840" y="670560"/>
+            <a:chExt cx="720000" cy="720000"/>
+          </a:xfrm>
+          <a:solidFill>
+            <a:srgbClr val="EDDD0D"/>
+          </a:solidFill>
+        </p:grpSpPr>
+        <p:sp>
+          <p:nvSpPr>
+            <p:cNvPr id="3" name="Rectangle 2">
+              <a:extLst>
+                <a:ext uri="{FF2B5EF4-FFF2-40B4-BE49-F238E27FC236}">
+                  <a16:creationId xmlns:a16="http://schemas.microsoft.com/office/drawing/2014/main" id="{3D5B3866-75AF-4E06-9612-FD447927ACAA}"/>
+                </a:ext>
+              </a:extLst>
+            </p:cNvPr>
+            <p:cNvSpPr/>
+            <p:nvPr/>
+          </p:nvSpPr>
+          <p:spPr>
+            <a:xfrm>
+              <a:off x="751840" y="670560"/>
+              <a:ext cx="720000" cy="720000"/>
+            </a:xfrm>
+            <a:prstGeom prst="rect">
+              <a:avLst/>
+            </a:prstGeom>
+            <a:grpFill/>
+            <a:ln w="9525"/>
+          </p:spPr>
+          <p:style>
+            <a:lnRef idx="2">
+              <a:schemeClr val="accent1">
+                <a:shade val="50000"/>
+              </a:schemeClr>
+            </a:lnRef>
+            <a:fillRef idx="1">
+              <a:schemeClr val="accent1"/>
+            </a:fillRef>
+            <a:effectRef idx="0">
+              <a:schemeClr val="accent1"/>
+            </a:effectRef>
+            <a:fontRef idx="minor">
+              <a:schemeClr val="lt1"/>
+            </a:fontRef>
+          </p:style>
+          <p:txBody>
+            <a:bodyPr rtlCol="0" anchor="ctr"/>
+            <a:lstStyle/>
+            <a:p>
+              <a:pPr algn="ctr"/>
+              <a:endParaRPr lang="es-419" sz="402" dirty="0"/>
+            </a:p>
+          </p:txBody>
+        </p:sp>
+        <p:cxnSp>
+          <p:nvCxnSpPr>
+            <p:cNvPr id="4" name="Connecteur droit 3">
+              <a:extLst>
+                <a:ext uri="{FF2B5EF4-FFF2-40B4-BE49-F238E27FC236}">
+                  <a16:creationId xmlns:a16="http://schemas.microsoft.com/office/drawing/2014/main" id="{C9CFDC09-3DAA-4E4E-B33D-41F7B34C8335}"/>
+                </a:ext>
+              </a:extLst>
+            </p:cNvPr>
+            <p:cNvCxnSpPr/>
+            <p:nvPr/>
+          </p:nvCxnSpPr>
+          <p:spPr>
+            <a:xfrm>
+              <a:off x="751840" y="670560"/>
+              <a:ext cx="720000" cy="720000"/>
+            </a:xfrm>
+            <a:prstGeom prst="line">
+              <a:avLst/>
+            </a:prstGeom>
+            <a:grpFill/>
+            <a:ln w="9525">
+              <a:solidFill>
+                <a:schemeClr val="bg1"/>
+              </a:solidFill>
+            </a:ln>
+          </p:spPr>
+          <p:style>
+            <a:lnRef idx="1">
+              <a:schemeClr val="accent1"/>
+            </a:lnRef>
+            <a:fillRef idx="0">
+              <a:schemeClr val="accent1"/>
+            </a:fillRef>
+            <a:effectRef idx="0">
+              <a:schemeClr val="accent1"/>
+            </a:effectRef>
+            <a:fontRef idx="minor">
+              <a:schemeClr val="tx1"/>
+            </a:fontRef>
+          </p:style>
+        </p:cxnSp>
+        <p:cxnSp>
+          <p:nvCxnSpPr>
+            <p:cNvPr id="5" name="Connecteur droit 4">
+              <a:extLst>
+                <a:ext uri="{FF2B5EF4-FFF2-40B4-BE49-F238E27FC236}">
+                  <a16:creationId xmlns:a16="http://schemas.microsoft.com/office/drawing/2014/main" id="{BF98F439-0216-4823-8707-8E9E8DAE0F45}"/>
+                </a:ext>
+              </a:extLst>
+            </p:cNvPr>
+            <p:cNvCxnSpPr>
+              <a:cxnSpLocks/>
+            </p:cNvCxnSpPr>
+            <p:nvPr/>
+          </p:nvCxnSpPr>
+          <p:spPr>
+            <a:xfrm flipH="1">
+              <a:off x="751840" y="670560"/>
+              <a:ext cx="720000" cy="720000"/>
+            </a:xfrm>
+            <a:prstGeom prst="line">
+              <a:avLst/>
+            </a:prstGeom>
+            <a:grpFill/>
+            <a:ln w="9525">
+              <a:solidFill>
+                <a:schemeClr val="bg1"/>
+              </a:solidFill>
+            </a:ln>
+          </p:spPr>
+          <p:style>
+            <a:lnRef idx="1">
+              <a:schemeClr val="accent1"/>
+            </a:lnRef>
+            <a:fillRef idx="0">
+              <a:schemeClr val="accent1"/>
+            </a:fillRef>
+            <a:effectRef idx="0">
+              <a:schemeClr val="accent1"/>
+            </a:effectRef>
+            <a:fontRef idx="minor">
+              <a:schemeClr val="tx1"/>
+            </a:fontRef>
+          </p:style>
+        </p:cxnSp>
+      </p:grpSp>
+      <p:sp>
+        <p:nvSpPr>
+          <p:cNvPr id="6" name="Ellipse 5">
+            <a:extLst>
+              <a:ext uri="{FF2B5EF4-FFF2-40B4-BE49-F238E27FC236}">
+                <a16:creationId xmlns:a16="http://schemas.microsoft.com/office/drawing/2014/main" id="{460EB9B2-0CBC-4950-9E4B-60AB72875D40}"/>
+              </a:ext>
+            </a:extLst>
+          </p:cNvPr>
+          <p:cNvSpPr/>
+          <p:nvPr/>
+        </p:nvSpPr>
+        <p:spPr>
+          <a:xfrm>
+            <a:off x="2861725" y="2340000"/>
+            <a:ext cx="36000" cy="36000"/>
+          </a:xfrm>
+          <a:prstGeom prst="ellipse">
+            <a:avLst/>
+          </a:prstGeom>
+          <a:solidFill>
+            <a:schemeClr val="bg1"/>
+          </a:solidFill>
+          <a:ln w="9525">
+            <a:solidFill>
+              <a:schemeClr val="bg1"/>
+            </a:solidFill>
+          </a:ln>
+          <a:effectLst>
+            <a:glow rad="139700">
+              <a:schemeClr val="accent3">
+                <a:satMod val="175000"/>
+                <a:alpha val="40000"/>
+              </a:schemeClr>
+            </a:glow>
+          </a:effectLst>
+        </p:spPr>
+        <p:style>
+          <a:lnRef idx="2">
+            <a:schemeClr val="accent1">
+              <a:shade val="50000"/>
+            </a:schemeClr>
+          </a:lnRef>
+          <a:fillRef idx="1">
+            <a:schemeClr val="accent1"/>
+          </a:fillRef>
+          <a:effectRef idx="0">
+            <a:schemeClr val="accent1"/>
+          </a:effectRef>
+          <a:fontRef idx="minor">
+            <a:schemeClr val="lt1"/>
+          </a:fontRef>
+        </p:style>
+        <p:txBody>
+          <a:bodyPr rtlCol="0" anchor="ctr"/>
+          <a:lstStyle/>
+          <a:p>
+            <a:pPr algn="ctr"/>
+            <a:endParaRPr lang="es-419" sz="402" dirty="0"/>
+          </a:p>
+        </p:txBody>
+      </p:sp>
+    </p:spTree>
+    <p:extLst>
+      <p:ext uri="{BB962C8B-B14F-4D97-AF65-F5344CB8AC3E}">
+        <p14:creationId xmlns:p14="http://schemas.microsoft.com/office/powerpoint/2010/main" val="3829322521"/>
+      </p:ext>
+    </p:extLst>
+  </p:cSld>
+  <p:clrMapOvr>
+    <a:masterClrMapping/>
+  </p:clrMapOvr>
+  <mc:AlternateContent xmlns:mc="http://schemas.openxmlformats.org/markup-compatibility/2006" xmlns:p14="http://schemas.microsoft.com/office/powerpoint/2010/main">
+    <mc:Choice Requires="p14">
+      <p:transition spd="slow" p14:dur="2000" advClick="0" advTm="2000"/>
+    </mc:Choice>
+    <mc:Fallback xmlns="">
+      <p:transition spd="slow" advClick="0" advTm="2000"/>
+    </mc:Fallback>
+  </mc:AlternateContent>
+</p:sld>
+</file>
+
+<file path=ppt/slides/slide23.xml><?xml version="1.0" encoding="utf-8"?>
+<p:sld xmlns:a="http://schemas.openxmlformats.org/drawingml/2006/main" xmlns:r="http://schemas.openxmlformats.org/officeDocument/2006/relationships" xmlns:p="http://schemas.openxmlformats.org/presentationml/2006/main">
+  <p:cSld>
+    <p:spTree>
+      <p:nvGrpSpPr>
+        <p:cNvPr id="1" name=""/>
+        <p:cNvGrpSpPr/>
+        <p:nvPr/>
+      </p:nvGrpSpPr>
+      <p:grpSpPr>
+        <a:xfrm>
+          <a:off x="0" y="0"/>
+          <a:ext cx="0" cy="0"/>
+          <a:chOff x="0" y="0"/>
+          <a:chExt cx="0" cy="0"/>
+        </a:xfrm>
+      </p:grpSpPr>
+      <p:grpSp>
+        <p:nvGrpSpPr>
+          <p:cNvPr id="2" name="Groupe 1">
+            <a:extLst>
+              <a:ext uri="{FF2B5EF4-FFF2-40B4-BE49-F238E27FC236}">
+                <a16:creationId xmlns:a16="http://schemas.microsoft.com/office/drawing/2014/main" id="{274C6116-F662-404F-BBBC-9A8AB19F7DB6}"/>
+              </a:ext>
+            </a:extLst>
+          </p:cNvPr>
+          <p:cNvGrpSpPr/>
+          <p:nvPr/>
+        </p:nvGrpSpPr>
+        <p:grpSpPr>
+          <a:xfrm>
+            <a:off x="1332000" y="1440000"/>
+            <a:ext cx="360000" cy="360000"/>
+            <a:chOff x="751840" y="670560"/>
+            <a:chExt cx="720000" cy="720000"/>
+          </a:xfrm>
+          <a:solidFill>
+            <a:srgbClr val="EDDD0D"/>
+          </a:solidFill>
+        </p:grpSpPr>
+        <p:sp>
+          <p:nvSpPr>
+            <p:cNvPr id="3" name="Rectangle 2">
+              <a:extLst>
+                <a:ext uri="{FF2B5EF4-FFF2-40B4-BE49-F238E27FC236}">
+                  <a16:creationId xmlns:a16="http://schemas.microsoft.com/office/drawing/2014/main" id="{74EFB6ED-EA27-4C05-9C13-08663FA5D8AD}"/>
+                </a:ext>
+              </a:extLst>
+            </p:cNvPr>
+            <p:cNvSpPr/>
+            <p:nvPr/>
+          </p:nvSpPr>
+          <p:spPr>
+            <a:xfrm>
+              <a:off x="751840" y="670560"/>
+              <a:ext cx="720000" cy="720000"/>
+            </a:xfrm>
+            <a:prstGeom prst="rect">
+              <a:avLst/>
+            </a:prstGeom>
+            <a:grpFill/>
+            <a:ln w="9525"/>
+          </p:spPr>
+          <p:style>
+            <a:lnRef idx="2">
+              <a:schemeClr val="accent1">
+                <a:shade val="50000"/>
+              </a:schemeClr>
+            </a:lnRef>
+            <a:fillRef idx="1">
+              <a:schemeClr val="accent1"/>
+            </a:fillRef>
+            <a:effectRef idx="0">
+              <a:schemeClr val="accent1"/>
+            </a:effectRef>
+            <a:fontRef idx="minor">
+              <a:schemeClr val="lt1"/>
+            </a:fontRef>
+          </p:style>
+          <p:txBody>
+            <a:bodyPr rtlCol="0" anchor="ctr"/>
+            <a:lstStyle/>
+            <a:p>
+              <a:pPr algn="ctr"/>
+              <a:endParaRPr lang="es-419" sz="402" dirty="0"/>
+            </a:p>
+          </p:txBody>
+        </p:sp>
+        <p:cxnSp>
+          <p:nvCxnSpPr>
+            <p:cNvPr id="4" name="Connecteur droit 3">
+              <a:extLst>
+                <a:ext uri="{FF2B5EF4-FFF2-40B4-BE49-F238E27FC236}">
+                  <a16:creationId xmlns:a16="http://schemas.microsoft.com/office/drawing/2014/main" id="{73703F32-2E4B-4AA9-B747-B29992EE21FA}"/>
+                </a:ext>
+              </a:extLst>
+            </p:cNvPr>
+            <p:cNvCxnSpPr/>
+            <p:nvPr/>
+          </p:nvCxnSpPr>
+          <p:spPr>
+            <a:xfrm>
+              <a:off x="751840" y="670560"/>
+              <a:ext cx="720000" cy="720000"/>
+            </a:xfrm>
+            <a:prstGeom prst="line">
+              <a:avLst/>
+            </a:prstGeom>
+            <a:grpFill/>
+            <a:ln w="9525">
+              <a:solidFill>
+                <a:schemeClr val="bg1"/>
+              </a:solidFill>
+            </a:ln>
+          </p:spPr>
+          <p:style>
+            <a:lnRef idx="1">
+              <a:schemeClr val="accent1"/>
+            </a:lnRef>
+            <a:fillRef idx="0">
+              <a:schemeClr val="accent1"/>
+            </a:fillRef>
+            <a:effectRef idx="0">
+              <a:schemeClr val="accent1"/>
+            </a:effectRef>
+            <a:fontRef idx="minor">
+              <a:schemeClr val="tx1"/>
+            </a:fontRef>
+          </p:style>
+        </p:cxnSp>
+        <p:cxnSp>
+          <p:nvCxnSpPr>
+            <p:cNvPr id="5" name="Connecteur droit 4">
+              <a:extLst>
+                <a:ext uri="{FF2B5EF4-FFF2-40B4-BE49-F238E27FC236}">
+                  <a16:creationId xmlns:a16="http://schemas.microsoft.com/office/drawing/2014/main" id="{1ED901FF-0579-4A8C-8191-6B1D6084553A}"/>
+                </a:ext>
+              </a:extLst>
+            </p:cNvPr>
+            <p:cNvCxnSpPr>
+              <a:cxnSpLocks/>
+            </p:cNvCxnSpPr>
+            <p:nvPr/>
+          </p:nvCxnSpPr>
+          <p:spPr>
+            <a:xfrm flipH="1">
+              <a:off x="751840" y="670560"/>
+              <a:ext cx="720000" cy="720000"/>
+            </a:xfrm>
+            <a:prstGeom prst="line">
+              <a:avLst/>
+            </a:prstGeom>
+            <a:grpFill/>
+            <a:ln w="9525">
+              <a:solidFill>
+                <a:schemeClr val="bg1"/>
+              </a:solidFill>
+            </a:ln>
+          </p:spPr>
+          <p:style>
+            <a:lnRef idx="1">
+              <a:schemeClr val="accent1"/>
+            </a:lnRef>
+            <a:fillRef idx="0">
+              <a:schemeClr val="accent1"/>
+            </a:fillRef>
+            <a:effectRef idx="0">
+              <a:schemeClr val="accent1"/>
+            </a:effectRef>
+            <a:fontRef idx="minor">
+              <a:schemeClr val="tx1"/>
+            </a:fontRef>
+          </p:style>
+        </p:cxnSp>
+      </p:grpSp>
+      <p:sp>
+        <p:nvSpPr>
+          <p:cNvPr id="6" name="Ellipse 5">
+            <a:extLst>
+              <a:ext uri="{FF2B5EF4-FFF2-40B4-BE49-F238E27FC236}">
+                <a16:creationId xmlns:a16="http://schemas.microsoft.com/office/drawing/2014/main" id="{144DFC81-5347-44BB-B813-8161DB5217CF}"/>
+              </a:ext>
+            </a:extLst>
+          </p:cNvPr>
+          <p:cNvSpPr/>
+          <p:nvPr/>
+        </p:nvSpPr>
+        <p:spPr>
+          <a:xfrm>
+            <a:off x="1494000" y="1602000"/>
+            <a:ext cx="36000" cy="36000"/>
+          </a:xfrm>
+          <a:prstGeom prst="ellipse">
+            <a:avLst/>
+          </a:prstGeom>
+          <a:solidFill>
+            <a:schemeClr val="bg1"/>
+          </a:solidFill>
+          <a:ln w="9525">
+            <a:solidFill>
+              <a:schemeClr val="bg1"/>
+            </a:solidFill>
+          </a:ln>
+          <a:effectLst>
+            <a:glow rad="139700">
+              <a:schemeClr val="accent3">
+                <a:satMod val="175000"/>
+                <a:alpha val="40000"/>
+              </a:schemeClr>
+            </a:glow>
+          </a:effectLst>
+        </p:spPr>
+        <p:style>
+          <a:lnRef idx="2">
+            <a:schemeClr val="accent1">
+              <a:shade val="50000"/>
+            </a:schemeClr>
+          </a:lnRef>
+          <a:fillRef idx="1">
+            <a:schemeClr val="accent1"/>
+          </a:fillRef>
+          <a:effectRef idx="0">
+            <a:schemeClr val="accent1"/>
+          </a:effectRef>
+          <a:fontRef idx="minor">
+            <a:schemeClr val="lt1"/>
+          </a:fontRef>
+        </p:style>
+        <p:txBody>
+          <a:bodyPr rtlCol="0" anchor="ctr"/>
+          <a:lstStyle/>
+          <a:p>
+            <a:pPr algn="ctr"/>
+            <a:endParaRPr lang="es-419" sz="402" dirty="0"/>
+          </a:p>
+        </p:txBody>
+      </p:sp>
+    </p:spTree>
+    <p:extLst>
+      <p:ext uri="{BB962C8B-B14F-4D97-AF65-F5344CB8AC3E}">
+        <p14:creationId xmlns:p14="http://schemas.microsoft.com/office/powerpoint/2010/main" val="3790328389"/>
+      </p:ext>
+    </p:extLst>
+  </p:cSld>
+  <p:clrMapOvr>
+    <a:masterClrMapping/>
+  </p:clrMapOvr>
+  <mc:AlternateContent xmlns:mc="http://schemas.openxmlformats.org/markup-compatibility/2006" xmlns:p14="http://schemas.microsoft.com/office/powerpoint/2010/main">
+    <mc:Choice Requires="p14">
+      <p:transition spd="slow" p14:dur="2000" advClick="0" advTm="2000"/>
+    </mc:Choice>
+    <mc:Fallback xmlns="">
+      <p:transition spd="slow" advClick="0" advTm="2000"/>
+    </mc:Fallback>
+  </mc:AlternateContent>
+</p:sld>
+</file>
+
+<file path=ppt/slides/slide24.xml><?xml version="1.0" encoding="utf-8"?>
 <p:sld xmlns:a="http://schemas.openxmlformats.org/drawingml/2006/main" xmlns:r="http://schemas.openxmlformats.org/officeDocument/2006/relationships" xmlns:p="http://schemas.openxmlformats.org/presentationml/2006/main">
   <p:cSld>
     <p:spTree>
@@ -6940,7 +7456,7 @@
 </p:sld>
 </file>
 
-<file path=ppt/slides/slide23.xml><?xml version="1.0" encoding="utf-8"?>
+<file path=ppt/slides/slide25.xml><?xml version="1.0" encoding="utf-8"?>
 <p:sld xmlns:a="http://schemas.openxmlformats.org/drawingml/2006/main" xmlns:r="http://schemas.openxmlformats.org/officeDocument/2006/relationships" xmlns:p="http://schemas.openxmlformats.org/presentationml/2006/main">
   <p:cSld>
     <p:spTree>
@@ -7198,778 +7714,7 @@
 </p:sld>
 </file>
 
-<file path=ppt/slides/slide24.xml><?xml version="1.0" encoding="utf-8"?>
-<p:sld xmlns:a="http://schemas.openxmlformats.org/drawingml/2006/main" xmlns:r="http://schemas.openxmlformats.org/officeDocument/2006/relationships" xmlns:p="http://schemas.openxmlformats.org/presentationml/2006/main">
-  <p:cSld>
-    <p:spTree>
-      <p:nvGrpSpPr>
-        <p:cNvPr id="1" name=""/>
-        <p:cNvGrpSpPr/>
-        <p:nvPr/>
-      </p:nvGrpSpPr>
-      <p:grpSpPr>
-        <a:xfrm>
-          <a:off x="0" y="0"/>
-          <a:ext cx="0" cy="0"/>
-          <a:chOff x="0" y="0"/>
-          <a:chExt cx="0" cy="0"/>
-        </a:xfrm>
-      </p:grpSpPr>
-      <p:grpSp>
-        <p:nvGrpSpPr>
-          <p:cNvPr id="2" name="Groupe 1">
-            <a:extLst>
-              <a:ext uri="{FF2B5EF4-FFF2-40B4-BE49-F238E27FC236}">
-                <a16:creationId xmlns:a16="http://schemas.microsoft.com/office/drawing/2014/main" id="{561CE806-7FC7-4D78-A1D1-BC82D34AF293}"/>
-              </a:ext>
-            </a:extLst>
-          </p:cNvPr>
-          <p:cNvGrpSpPr/>
-          <p:nvPr/>
-        </p:nvGrpSpPr>
-        <p:grpSpPr>
-          <a:xfrm>
-            <a:off x="2700000" y="2178000"/>
-            <a:ext cx="360000" cy="360000"/>
-            <a:chOff x="751840" y="670560"/>
-            <a:chExt cx="720000" cy="720000"/>
-          </a:xfrm>
-          <a:solidFill>
-            <a:srgbClr val="EDDD0D"/>
-          </a:solidFill>
-        </p:grpSpPr>
-        <p:sp>
-          <p:nvSpPr>
-            <p:cNvPr id="3" name="Rectangle 2">
-              <a:extLst>
-                <a:ext uri="{FF2B5EF4-FFF2-40B4-BE49-F238E27FC236}">
-                  <a16:creationId xmlns:a16="http://schemas.microsoft.com/office/drawing/2014/main" id="{3D5B3866-75AF-4E06-9612-FD447927ACAA}"/>
-                </a:ext>
-              </a:extLst>
-            </p:cNvPr>
-            <p:cNvSpPr/>
-            <p:nvPr/>
-          </p:nvSpPr>
-          <p:spPr>
-            <a:xfrm>
-              <a:off x="751840" y="670560"/>
-              <a:ext cx="720000" cy="720000"/>
-            </a:xfrm>
-            <a:prstGeom prst="rect">
-              <a:avLst/>
-            </a:prstGeom>
-            <a:grpFill/>
-            <a:ln w="9525"/>
-          </p:spPr>
-          <p:style>
-            <a:lnRef idx="2">
-              <a:schemeClr val="accent1">
-                <a:shade val="50000"/>
-              </a:schemeClr>
-            </a:lnRef>
-            <a:fillRef idx="1">
-              <a:schemeClr val="accent1"/>
-            </a:fillRef>
-            <a:effectRef idx="0">
-              <a:schemeClr val="accent1"/>
-            </a:effectRef>
-            <a:fontRef idx="minor">
-              <a:schemeClr val="lt1"/>
-            </a:fontRef>
-          </p:style>
-          <p:txBody>
-            <a:bodyPr rtlCol="0" anchor="ctr"/>
-            <a:lstStyle/>
-            <a:p>
-              <a:pPr algn="ctr"/>
-              <a:endParaRPr lang="es-419" sz="402" dirty="0"/>
-            </a:p>
-          </p:txBody>
-        </p:sp>
-        <p:cxnSp>
-          <p:nvCxnSpPr>
-            <p:cNvPr id="4" name="Connecteur droit 3">
-              <a:extLst>
-                <a:ext uri="{FF2B5EF4-FFF2-40B4-BE49-F238E27FC236}">
-                  <a16:creationId xmlns:a16="http://schemas.microsoft.com/office/drawing/2014/main" id="{C9CFDC09-3DAA-4E4E-B33D-41F7B34C8335}"/>
-                </a:ext>
-              </a:extLst>
-            </p:cNvPr>
-            <p:cNvCxnSpPr/>
-            <p:nvPr/>
-          </p:nvCxnSpPr>
-          <p:spPr>
-            <a:xfrm>
-              <a:off x="751840" y="670560"/>
-              <a:ext cx="720000" cy="720000"/>
-            </a:xfrm>
-            <a:prstGeom prst="line">
-              <a:avLst/>
-            </a:prstGeom>
-            <a:grpFill/>
-            <a:ln w="9525">
-              <a:solidFill>
-                <a:schemeClr val="bg1"/>
-              </a:solidFill>
-            </a:ln>
-          </p:spPr>
-          <p:style>
-            <a:lnRef idx="1">
-              <a:schemeClr val="accent1"/>
-            </a:lnRef>
-            <a:fillRef idx="0">
-              <a:schemeClr val="accent1"/>
-            </a:fillRef>
-            <a:effectRef idx="0">
-              <a:schemeClr val="accent1"/>
-            </a:effectRef>
-            <a:fontRef idx="minor">
-              <a:schemeClr val="tx1"/>
-            </a:fontRef>
-          </p:style>
-        </p:cxnSp>
-        <p:cxnSp>
-          <p:nvCxnSpPr>
-            <p:cNvPr id="5" name="Connecteur droit 4">
-              <a:extLst>
-                <a:ext uri="{FF2B5EF4-FFF2-40B4-BE49-F238E27FC236}">
-                  <a16:creationId xmlns:a16="http://schemas.microsoft.com/office/drawing/2014/main" id="{BF98F439-0216-4823-8707-8E9E8DAE0F45}"/>
-                </a:ext>
-              </a:extLst>
-            </p:cNvPr>
-            <p:cNvCxnSpPr>
-              <a:cxnSpLocks/>
-            </p:cNvCxnSpPr>
-            <p:nvPr/>
-          </p:nvCxnSpPr>
-          <p:spPr>
-            <a:xfrm flipH="1">
-              <a:off x="751840" y="670560"/>
-              <a:ext cx="720000" cy="720000"/>
-            </a:xfrm>
-            <a:prstGeom prst="line">
-              <a:avLst/>
-            </a:prstGeom>
-            <a:grpFill/>
-            <a:ln w="9525">
-              <a:solidFill>
-                <a:schemeClr val="bg1"/>
-              </a:solidFill>
-            </a:ln>
-          </p:spPr>
-          <p:style>
-            <a:lnRef idx="1">
-              <a:schemeClr val="accent1"/>
-            </a:lnRef>
-            <a:fillRef idx="0">
-              <a:schemeClr val="accent1"/>
-            </a:fillRef>
-            <a:effectRef idx="0">
-              <a:schemeClr val="accent1"/>
-            </a:effectRef>
-            <a:fontRef idx="minor">
-              <a:schemeClr val="tx1"/>
-            </a:fontRef>
-          </p:style>
-        </p:cxnSp>
-      </p:grpSp>
-      <p:sp>
-        <p:nvSpPr>
-          <p:cNvPr id="6" name="Ellipse 5">
-            <a:extLst>
-              <a:ext uri="{FF2B5EF4-FFF2-40B4-BE49-F238E27FC236}">
-                <a16:creationId xmlns:a16="http://schemas.microsoft.com/office/drawing/2014/main" id="{460EB9B2-0CBC-4950-9E4B-60AB72875D40}"/>
-              </a:ext>
-            </a:extLst>
-          </p:cNvPr>
-          <p:cNvSpPr/>
-          <p:nvPr/>
-        </p:nvSpPr>
-        <p:spPr>
-          <a:xfrm>
-            <a:off x="2861725" y="2340000"/>
-            <a:ext cx="36000" cy="36000"/>
-          </a:xfrm>
-          <a:prstGeom prst="ellipse">
-            <a:avLst/>
-          </a:prstGeom>
-          <a:solidFill>
-            <a:schemeClr val="bg1"/>
-          </a:solidFill>
-          <a:ln w="9525">
-            <a:solidFill>
-              <a:schemeClr val="bg1"/>
-            </a:solidFill>
-          </a:ln>
-          <a:effectLst>
-            <a:glow rad="139700">
-              <a:schemeClr val="accent3">
-                <a:satMod val="175000"/>
-                <a:alpha val="40000"/>
-              </a:schemeClr>
-            </a:glow>
-          </a:effectLst>
-        </p:spPr>
-        <p:style>
-          <a:lnRef idx="2">
-            <a:schemeClr val="accent1">
-              <a:shade val="50000"/>
-            </a:schemeClr>
-          </a:lnRef>
-          <a:fillRef idx="1">
-            <a:schemeClr val="accent1"/>
-          </a:fillRef>
-          <a:effectRef idx="0">
-            <a:schemeClr val="accent1"/>
-          </a:effectRef>
-          <a:fontRef idx="minor">
-            <a:schemeClr val="lt1"/>
-          </a:fontRef>
-        </p:style>
-        <p:txBody>
-          <a:bodyPr rtlCol="0" anchor="ctr"/>
-          <a:lstStyle/>
-          <a:p>
-            <a:pPr algn="ctr"/>
-            <a:endParaRPr lang="es-419" sz="402" dirty="0"/>
-          </a:p>
-        </p:txBody>
-      </p:sp>
-    </p:spTree>
-    <p:extLst>
-      <p:ext uri="{BB962C8B-B14F-4D97-AF65-F5344CB8AC3E}">
-        <p14:creationId xmlns:p14="http://schemas.microsoft.com/office/powerpoint/2010/main" val="3829322521"/>
-      </p:ext>
-    </p:extLst>
-  </p:cSld>
-  <p:clrMapOvr>
-    <a:masterClrMapping/>
-  </p:clrMapOvr>
-  <mc:AlternateContent xmlns:mc="http://schemas.openxmlformats.org/markup-compatibility/2006" xmlns:p14="http://schemas.microsoft.com/office/powerpoint/2010/main">
-    <mc:Choice Requires="p14">
-      <p:transition spd="slow" p14:dur="2000" advClick="0" advTm="2000"/>
-    </mc:Choice>
-    <mc:Fallback xmlns="">
-      <p:transition spd="slow" advClick="0" advTm="2000"/>
-    </mc:Fallback>
-  </mc:AlternateContent>
-</p:sld>
-</file>
-
-<file path=ppt/slides/slide25.xml><?xml version="1.0" encoding="utf-8"?>
-<p:sld xmlns:a="http://schemas.openxmlformats.org/drawingml/2006/main" xmlns:r="http://schemas.openxmlformats.org/officeDocument/2006/relationships" xmlns:p="http://schemas.openxmlformats.org/presentationml/2006/main">
-  <p:cSld>
-    <p:spTree>
-      <p:nvGrpSpPr>
-        <p:cNvPr id="1" name=""/>
-        <p:cNvGrpSpPr/>
-        <p:nvPr/>
-      </p:nvGrpSpPr>
-      <p:grpSpPr>
-        <a:xfrm>
-          <a:off x="0" y="0"/>
-          <a:ext cx="0" cy="0"/>
-          <a:chOff x="0" y="0"/>
-          <a:chExt cx="0" cy="0"/>
-        </a:xfrm>
-      </p:grpSpPr>
-      <p:grpSp>
-        <p:nvGrpSpPr>
-          <p:cNvPr id="2" name="Groupe 1">
-            <a:extLst>
-              <a:ext uri="{FF2B5EF4-FFF2-40B4-BE49-F238E27FC236}">
-                <a16:creationId xmlns:a16="http://schemas.microsoft.com/office/drawing/2014/main" id="{274C6116-F662-404F-BBBC-9A8AB19F7DB6}"/>
-              </a:ext>
-            </a:extLst>
-          </p:cNvPr>
-          <p:cNvGrpSpPr/>
-          <p:nvPr/>
-        </p:nvGrpSpPr>
-        <p:grpSpPr>
-          <a:xfrm>
-            <a:off x="1332000" y="1440000"/>
-            <a:ext cx="360000" cy="360000"/>
-            <a:chOff x="751840" y="670560"/>
-            <a:chExt cx="720000" cy="720000"/>
-          </a:xfrm>
-          <a:solidFill>
-            <a:srgbClr val="EDDD0D"/>
-          </a:solidFill>
-        </p:grpSpPr>
-        <p:sp>
-          <p:nvSpPr>
-            <p:cNvPr id="3" name="Rectangle 2">
-              <a:extLst>
-                <a:ext uri="{FF2B5EF4-FFF2-40B4-BE49-F238E27FC236}">
-                  <a16:creationId xmlns:a16="http://schemas.microsoft.com/office/drawing/2014/main" id="{74EFB6ED-EA27-4C05-9C13-08663FA5D8AD}"/>
-                </a:ext>
-              </a:extLst>
-            </p:cNvPr>
-            <p:cNvSpPr/>
-            <p:nvPr/>
-          </p:nvSpPr>
-          <p:spPr>
-            <a:xfrm>
-              <a:off x="751840" y="670560"/>
-              <a:ext cx="720000" cy="720000"/>
-            </a:xfrm>
-            <a:prstGeom prst="rect">
-              <a:avLst/>
-            </a:prstGeom>
-            <a:grpFill/>
-            <a:ln w="9525"/>
-          </p:spPr>
-          <p:style>
-            <a:lnRef idx="2">
-              <a:schemeClr val="accent1">
-                <a:shade val="50000"/>
-              </a:schemeClr>
-            </a:lnRef>
-            <a:fillRef idx="1">
-              <a:schemeClr val="accent1"/>
-            </a:fillRef>
-            <a:effectRef idx="0">
-              <a:schemeClr val="accent1"/>
-            </a:effectRef>
-            <a:fontRef idx="minor">
-              <a:schemeClr val="lt1"/>
-            </a:fontRef>
-          </p:style>
-          <p:txBody>
-            <a:bodyPr rtlCol="0" anchor="ctr"/>
-            <a:lstStyle/>
-            <a:p>
-              <a:pPr algn="ctr"/>
-              <a:endParaRPr lang="es-419" sz="402" dirty="0"/>
-            </a:p>
-          </p:txBody>
-        </p:sp>
-        <p:cxnSp>
-          <p:nvCxnSpPr>
-            <p:cNvPr id="4" name="Connecteur droit 3">
-              <a:extLst>
-                <a:ext uri="{FF2B5EF4-FFF2-40B4-BE49-F238E27FC236}">
-                  <a16:creationId xmlns:a16="http://schemas.microsoft.com/office/drawing/2014/main" id="{73703F32-2E4B-4AA9-B747-B29992EE21FA}"/>
-                </a:ext>
-              </a:extLst>
-            </p:cNvPr>
-            <p:cNvCxnSpPr/>
-            <p:nvPr/>
-          </p:nvCxnSpPr>
-          <p:spPr>
-            <a:xfrm>
-              <a:off x="751840" y="670560"/>
-              <a:ext cx="720000" cy="720000"/>
-            </a:xfrm>
-            <a:prstGeom prst="line">
-              <a:avLst/>
-            </a:prstGeom>
-            <a:grpFill/>
-            <a:ln w="9525">
-              <a:solidFill>
-                <a:schemeClr val="bg1"/>
-              </a:solidFill>
-            </a:ln>
-          </p:spPr>
-          <p:style>
-            <a:lnRef idx="1">
-              <a:schemeClr val="accent1"/>
-            </a:lnRef>
-            <a:fillRef idx="0">
-              <a:schemeClr val="accent1"/>
-            </a:fillRef>
-            <a:effectRef idx="0">
-              <a:schemeClr val="accent1"/>
-            </a:effectRef>
-            <a:fontRef idx="minor">
-              <a:schemeClr val="tx1"/>
-            </a:fontRef>
-          </p:style>
-        </p:cxnSp>
-        <p:cxnSp>
-          <p:nvCxnSpPr>
-            <p:cNvPr id="5" name="Connecteur droit 4">
-              <a:extLst>
-                <a:ext uri="{FF2B5EF4-FFF2-40B4-BE49-F238E27FC236}">
-                  <a16:creationId xmlns:a16="http://schemas.microsoft.com/office/drawing/2014/main" id="{1ED901FF-0579-4A8C-8191-6B1D6084553A}"/>
-                </a:ext>
-              </a:extLst>
-            </p:cNvPr>
-            <p:cNvCxnSpPr>
-              <a:cxnSpLocks/>
-            </p:cNvCxnSpPr>
-            <p:nvPr/>
-          </p:nvCxnSpPr>
-          <p:spPr>
-            <a:xfrm flipH="1">
-              <a:off x="751840" y="670560"/>
-              <a:ext cx="720000" cy="720000"/>
-            </a:xfrm>
-            <a:prstGeom prst="line">
-              <a:avLst/>
-            </a:prstGeom>
-            <a:grpFill/>
-            <a:ln w="9525">
-              <a:solidFill>
-                <a:schemeClr val="bg1"/>
-              </a:solidFill>
-            </a:ln>
-          </p:spPr>
-          <p:style>
-            <a:lnRef idx="1">
-              <a:schemeClr val="accent1"/>
-            </a:lnRef>
-            <a:fillRef idx="0">
-              <a:schemeClr val="accent1"/>
-            </a:fillRef>
-            <a:effectRef idx="0">
-              <a:schemeClr val="accent1"/>
-            </a:effectRef>
-            <a:fontRef idx="minor">
-              <a:schemeClr val="tx1"/>
-            </a:fontRef>
-          </p:style>
-        </p:cxnSp>
-      </p:grpSp>
-      <p:sp>
-        <p:nvSpPr>
-          <p:cNvPr id="6" name="Ellipse 5">
-            <a:extLst>
-              <a:ext uri="{FF2B5EF4-FFF2-40B4-BE49-F238E27FC236}">
-                <a16:creationId xmlns:a16="http://schemas.microsoft.com/office/drawing/2014/main" id="{144DFC81-5347-44BB-B813-8161DB5217CF}"/>
-              </a:ext>
-            </a:extLst>
-          </p:cNvPr>
-          <p:cNvSpPr/>
-          <p:nvPr/>
-        </p:nvSpPr>
-        <p:spPr>
-          <a:xfrm>
-            <a:off x="1494000" y="1602000"/>
-            <a:ext cx="36000" cy="36000"/>
-          </a:xfrm>
-          <a:prstGeom prst="ellipse">
-            <a:avLst/>
-          </a:prstGeom>
-          <a:solidFill>
-            <a:schemeClr val="bg1"/>
-          </a:solidFill>
-          <a:ln w="9525">
-            <a:solidFill>
-              <a:schemeClr val="bg1"/>
-            </a:solidFill>
-          </a:ln>
-          <a:effectLst>
-            <a:glow rad="139700">
-              <a:schemeClr val="accent3">
-                <a:satMod val="175000"/>
-                <a:alpha val="40000"/>
-              </a:schemeClr>
-            </a:glow>
-          </a:effectLst>
-        </p:spPr>
-        <p:style>
-          <a:lnRef idx="2">
-            <a:schemeClr val="accent1">
-              <a:shade val="50000"/>
-            </a:schemeClr>
-          </a:lnRef>
-          <a:fillRef idx="1">
-            <a:schemeClr val="accent1"/>
-          </a:fillRef>
-          <a:effectRef idx="0">
-            <a:schemeClr val="accent1"/>
-          </a:effectRef>
-          <a:fontRef idx="minor">
-            <a:schemeClr val="lt1"/>
-          </a:fontRef>
-        </p:style>
-        <p:txBody>
-          <a:bodyPr rtlCol="0" anchor="ctr"/>
-          <a:lstStyle/>
-          <a:p>
-            <a:pPr algn="ctr"/>
-            <a:endParaRPr lang="es-419" sz="402" dirty="0"/>
-          </a:p>
-        </p:txBody>
-      </p:sp>
-    </p:spTree>
-    <p:extLst>
-      <p:ext uri="{BB962C8B-B14F-4D97-AF65-F5344CB8AC3E}">
-        <p14:creationId xmlns:p14="http://schemas.microsoft.com/office/powerpoint/2010/main" val="3790328389"/>
-      </p:ext>
-    </p:extLst>
-  </p:cSld>
-  <p:clrMapOvr>
-    <a:masterClrMapping/>
-  </p:clrMapOvr>
-  <mc:AlternateContent xmlns:mc="http://schemas.openxmlformats.org/markup-compatibility/2006" xmlns:p14="http://schemas.microsoft.com/office/powerpoint/2010/main">
-    <mc:Choice Requires="p14">
-      <p:transition spd="slow" p14:dur="2000" advClick="0" advTm="2000"/>
-    </mc:Choice>
-    <mc:Fallback xmlns="">
-      <p:transition spd="slow" advClick="0" advTm="2000"/>
-    </mc:Fallback>
-  </mc:AlternateContent>
-</p:sld>
-</file>
-
 <file path=ppt/slides/slide3.xml><?xml version="1.0" encoding="utf-8"?>
-<p:sld xmlns:a="http://schemas.openxmlformats.org/drawingml/2006/main" xmlns:r="http://schemas.openxmlformats.org/officeDocument/2006/relationships" xmlns:p="http://schemas.openxmlformats.org/presentationml/2006/main">
-  <p:cSld>
-    <p:spTree>
-      <p:nvGrpSpPr>
-        <p:cNvPr id="1" name=""/>
-        <p:cNvGrpSpPr/>
-        <p:nvPr/>
-      </p:nvGrpSpPr>
-      <p:grpSpPr>
-        <a:xfrm>
-          <a:off x="0" y="0"/>
-          <a:ext cx="0" cy="0"/>
-          <a:chOff x="0" y="0"/>
-          <a:chExt cx="0" cy="0"/>
-        </a:xfrm>
-      </p:grpSpPr>
-      <p:grpSp>
-        <p:nvGrpSpPr>
-          <p:cNvPr id="2" name="Groupe 1">
-            <a:extLst>
-              <a:ext uri="{FF2B5EF4-FFF2-40B4-BE49-F238E27FC236}">
-                <a16:creationId xmlns:a16="http://schemas.microsoft.com/office/drawing/2014/main" id="{47BF7579-A4CD-4F59-B028-2F2B692BEE77}"/>
-              </a:ext>
-            </a:extLst>
-          </p:cNvPr>
-          <p:cNvGrpSpPr/>
-          <p:nvPr/>
-        </p:nvGrpSpPr>
-        <p:grpSpPr>
-          <a:xfrm>
-            <a:off x="5399450" y="2879890"/>
-            <a:ext cx="360000" cy="360000"/>
-            <a:chOff x="751840" y="670560"/>
-            <a:chExt cx="720000" cy="720000"/>
-          </a:xfrm>
-        </p:grpSpPr>
-        <p:sp>
-          <p:nvSpPr>
-            <p:cNvPr id="3" name="Rectangle 2">
-              <a:extLst>
-                <a:ext uri="{FF2B5EF4-FFF2-40B4-BE49-F238E27FC236}">
-                  <a16:creationId xmlns:a16="http://schemas.microsoft.com/office/drawing/2014/main" id="{E0F33B7F-C673-467C-8610-C8ACA3204BC9}"/>
-                </a:ext>
-              </a:extLst>
-            </p:cNvPr>
-            <p:cNvSpPr/>
-            <p:nvPr/>
-          </p:nvSpPr>
-          <p:spPr>
-            <a:xfrm>
-              <a:off x="751840" y="670560"/>
-              <a:ext cx="720000" cy="720000"/>
-            </a:xfrm>
-            <a:prstGeom prst="rect">
-              <a:avLst/>
-            </a:prstGeom>
-            <a:solidFill>
-              <a:schemeClr val="accent1"/>
-            </a:solidFill>
-            <a:ln w="9525"/>
-          </p:spPr>
-          <p:style>
-            <a:lnRef idx="2">
-              <a:schemeClr val="accent1">
-                <a:shade val="50000"/>
-              </a:schemeClr>
-            </a:lnRef>
-            <a:fillRef idx="1">
-              <a:schemeClr val="accent1"/>
-            </a:fillRef>
-            <a:effectRef idx="0">
-              <a:schemeClr val="accent1"/>
-            </a:effectRef>
-            <a:fontRef idx="minor">
-              <a:schemeClr val="lt1"/>
-            </a:fontRef>
-          </p:style>
-          <p:txBody>
-            <a:bodyPr rtlCol="0" anchor="ctr"/>
-            <a:lstStyle/>
-            <a:p>
-              <a:pPr algn="ctr"/>
-              <a:endParaRPr lang="es-419" sz="402" dirty="0"/>
-            </a:p>
-          </p:txBody>
-        </p:sp>
-        <p:cxnSp>
-          <p:nvCxnSpPr>
-            <p:cNvPr id="4" name="Connecteur droit 3">
-              <a:extLst>
-                <a:ext uri="{FF2B5EF4-FFF2-40B4-BE49-F238E27FC236}">
-                  <a16:creationId xmlns:a16="http://schemas.microsoft.com/office/drawing/2014/main" id="{9939A0F8-EB8E-4DAF-BF0B-01E37AF33C9D}"/>
-                </a:ext>
-              </a:extLst>
-            </p:cNvPr>
-            <p:cNvCxnSpPr/>
-            <p:nvPr/>
-          </p:nvCxnSpPr>
-          <p:spPr>
-            <a:xfrm>
-              <a:off x="751840" y="670560"/>
-              <a:ext cx="720000" cy="720000"/>
-            </a:xfrm>
-            <a:prstGeom prst="line">
-              <a:avLst/>
-            </a:prstGeom>
-            <a:ln w="9525">
-              <a:solidFill>
-                <a:schemeClr val="bg1"/>
-              </a:solidFill>
-            </a:ln>
-          </p:spPr>
-          <p:style>
-            <a:lnRef idx="1">
-              <a:schemeClr val="accent1"/>
-            </a:lnRef>
-            <a:fillRef idx="0">
-              <a:schemeClr val="accent1"/>
-            </a:fillRef>
-            <a:effectRef idx="0">
-              <a:schemeClr val="accent1"/>
-            </a:effectRef>
-            <a:fontRef idx="minor">
-              <a:schemeClr val="tx1"/>
-            </a:fontRef>
-          </p:style>
-        </p:cxnSp>
-        <p:cxnSp>
-          <p:nvCxnSpPr>
-            <p:cNvPr id="5" name="Connecteur droit 4">
-              <a:extLst>
-                <a:ext uri="{FF2B5EF4-FFF2-40B4-BE49-F238E27FC236}">
-                  <a16:creationId xmlns:a16="http://schemas.microsoft.com/office/drawing/2014/main" id="{290F657A-9E85-4845-9FC8-C41E0FA9F48F}"/>
-                </a:ext>
-              </a:extLst>
-            </p:cNvPr>
-            <p:cNvCxnSpPr>
-              <a:cxnSpLocks/>
-            </p:cNvCxnSpPr>
-            <p:nvPr/>
-          </p:nvCxnSpPr>
-          <p:spPr>
-            <a:xfrm flipH="1">
-              <a:off x="751840" y="670560"/>
-              <a:ext cx="720000" cy="720000"/>
-            </a:xfrm>
-            <a:prstGeom prst="line">
-              <a:avLst/>
-            </a:prstGeom>
-            <a:ln w="9525">
-              <a:solidFill>
-                <a:schemeClr val="bg1"/>
-              </a:solidFill>
-            </a:ln>
-          </p:spPr>
-          <p:style>
-            <a:lnRef idx="1">
-              <a:schemeClr val="accent1"/>
-            </a:lnRef>
-            <a:fillRef idx="0">
-              <a:schemeClr val="accent1"/>
-            </a:fillRef>
-            <a:effectRef idx="0">
-              <a:schemeClr val="accent1"/>
-            </a:effectRef>
-            <a:fontRef idx="minor">
-              <a:schemeClr val="tx1"/>
-            </a:fontRef>
-          </p:style>
-        </p:cxnSp>
-      </p:grpSp>
-      <p:sp>
-        <p:nvSpPr>
-          <p:cNvPr id="6" name="Ellipse 5">
-            <a:extLst>
-              <a:ext uri="{FF2B5EF4-FFF2-40B4-BE49-F238E27FC236}">
-                <a16:creationId xmlns:a16="http://schemas.microsoft.com/office/drawing/2014/main" id="{5637FC77-26B6-42D3-AFA0-8D2B206B7303}"/>
-              </a:ext>
-            </a:extLst>
-          </p:cNvPr>
-          <p:cNvSpPr/>
-          <p:nvPr/>
-        </p:nvSpPr>
-        <p:spPr>
-          <a:xfrm>
-            <a:off x="5561450" y="3041890"/>
-            <a:ext cx="36000" cy="36000"/>
-          </a:xfrm>
-          <a:prstGeom prst="ellipse">
-            <a:avLst/>
-          </a:prstGeom>
-          <a:solidFill>
-            <a:schemeClr val="bg1"/>
-          </a:solidFill>
-          <a:ln w="9525">
-            <a:solidFill>
-              <a:schemeClr val="bg1"/>
-            </a:solidFill>
-          </a:ln>
-          <a:effectLst>
-            <a:glow rad="139700">
-              <a:schemeClr val="accent3">
-                <a:satMod val="175000"/>
-                <a:alpha val="40000"/>
-              </a:schemeClr>
-            </a:glow>
-          </a:effectLst>
-        </p:spPr>
-        <p:style>
-          <a:lnRef idx="2">
-            <a:schemeClr val="accent1">
-              <a:shade val="50000"/>
-            </a:schemeClr>
-          </a:lnRef>
-          <a:fillRef idx="1">
-            <a:schemeClr val="accent1"/>
-          </a:fillRef>
-          <a:effectRef idx="0">
-            <a:schemeClr val="accent1"/>
-          </a:effectRef>
-          <a:fontRef idx="minor">
-            <a:schemeClr val="lt1"/>
-          </a:fontRef>
-        </p:style>
-        <p:txBody>
-          <a:bodyPr rtlCol="0" anchor="ctr"/>
-          <a:lstStyle/>
-          <a:p>
-            <a:pPr algn="ctr"/>
-            <a:endParaRPr lang="es-419" sz="402" dirty="0"/>
-          </a:p>
-        </p:txBody>
-      </p:sp>
-    </p:spTree>
-    <p:extLst>
-      <p:ext uri="{BB962C8B-B14F-4D97-AF65-F5344CB8AC3E}">
-        <p14:creationId xmlns:p14="http://schemas.microsoft.com/office/powerpoint/2010/main" val="4209917558"/>
-      </p:ext>
-    </p:extLst>
-  </p:cSld>
-  <p:clrMapOvr>
-    <a:masterClrMapping/>
-  </p:clrMapOvr>
-  <mc:AlternateContent xmlns:mc="http://schemas.openxmlformats.org/markup-compatibility/2006" xmlns:p14="http://schemas.microsoft.com/office/powerpoint/2010/main">
-    <mc:Choice Requires="p14">
-      <p:transition spd="slow" p14:dur="2000" advClick="0" advTm="2000"/>
-    </mc:Choice>
-    <mc:Fallback xmlns="">
-      <p:transition spd="slow" advClick="0" advTm="2000"/>
-    </mc:Fallback>
-  </mc:AlternateContent>
-</p:sld>
-</file>
-
-<file path=ppt/slides/slide4.xml><?xml version="1.0" encoding="utf-8"?>
 <p:sld xmlns:a="http://schemas.openxmlformats.org/drawingml/2006/main" xmlns:r="http://schemas.openxmlformats.org/officeDocument/2006/relationships" xmlns:p="http://schemas.openxmlformats.org/presentationml/2006/main">
   <p:cSld>
     <p:spTree>
@@ -8207,6 +7952,261 @@
     <p:extLst>
       <p:ext uri="{BB962C8B-B14F-4D97-AF65-F5344CB8AC3E}">
         <p14:creationId xmlns:p14="http://schemas.microsoft.com/office/powerpoint/2010/main" val="52035971"/>
+      </p:ext>
+    </p:extLst>
+  </p:cSld>
+  <p:clrMapOvr>
+    <a:masterClrMapping/>
+  </p:clrMapOvr>
+  <mc:AlternateContent xmlns:mc="http://schemas.openxmlformats.org/markup-compatibility/2006" xmlns:p14="http://schemas.microsoft.com/office/powerpoint/2010/main">
+    <mc:Choice Requires="p14">
+      <p:transition spd="slow" p14:dur="2000" advClick="0" advTm="2000"/>
+    </mc:Choice>
+    <mc:Fallback xmlns="">
+      <p:transition spd="slow" advClick="0" advTm="2000"/>
+    </mc:Fallback>
+  </mc:AlternateContent>
+</p:sld>
+</file>
+
+<file path=ppt/slides/slide4.xml><?xml version="1.0" encoding="utf-8"?>
+<p:sld xmlns:a="http://schemas.openxmlformats.org/drawingml/2006/main" xmlns:r="http://schemas.openxmlformats.org/officeDocument/2006/relationships" xmlns:p="http://schemas.openxmlformats.org/presentationml/2006/main">
+  <p:cSld>
+    <p:spTree>
+      <p:nvGrpSpPr>
+        <p:cNvPr id="1" name=""/>
+        <p:cNvGrpSpPr/>
+        <p:nvPr/>
+      </p:nvGrpSpPr>
+      <p:grpSpPr>
+        <a:xfrm>
+          <a:off x="0" y="0"/>
+          <a:ext cx="0" cy="0"/>
+          <a:chOff x="0" y="0"/>
+          <a:chExt cx="0" cy="0"/>
+        </a:xfrm>
+      </p:grpSpPr>
+      <p:grpSp>
+        <p:nvGrpSpPr>
+          <p:cNvPr id="4" name="Groupe 3">
+            <a:extLst>
+              <a:ext uri="{FF2B5EF4-FFF2-40B4-BE49-F238E27FC236}">
+                <a16:creationId xmlns:a16="http://schemas.microsoft.com/office/drawing/2014/main" id="{A677340D-9883-468E-8A99-2798519B8EDA}"/>
+              </a:ext>
+            </a:extLst>
+          </p:cNvPr>
+          <p:cNvGrpSpPr/>
+          <p:nvPr/>
+        </p:nvGrpSpPr>
+        <p:grpSpPr>
+          <a:xfrm>
+            <a:off x="5399450" y="198"/>
+            <a:ext cx="360000" cy="360000"/>
+            <a:chOff x="751840" y="670560"/>
+            <a:chExt cx="720000" cy="720000"/>
+          </a:xfrm>
+        </p:grpSpPr>
+        <p:sp>
+          <p:nvSpPr>
+            <p:cNvPr id="5" name="Rectangle 4">
+              <a:extLst>
+                <a:ext uri="{FF2B5EF4-FFF2-40B4-BE49-F238E27FC236}">
+                  <a16:creationId xmlns:a16="http://schemas.microsoft.com/office/drawing/2014/main" id="{77FD1D4F-6BD0-4BF4-83B0-ACF7F1E21871}"/>
+                </a:ext>
+              </a:extLst>
+            </p:cNvPr>
+            <p:cNvSpPr/>
+            <p:nvPr/>
+          </p:nvSpPr>
+          <p:spPr>
+            <a:xfrm>
+              <a:off x="751840" y="670560"/>
+              <a:ext cx="720000" cy="720000"/>
+            </a:xfrm>
+            <a:prstGeom prst="rect">
+              <a:avLst/>
+            </a:prstGeom>
+            <a:solidFill>
+              <a:schemeClr val="accent1"/>
+            </a:solidFill>
+            <a:ln w="9525"/>
+          </p:spPr>
+          <p:style>
+            <a:lnRef idx="2">
+              <a:schemeClr val="accent1">
+                <a:shade val="50000"/>
+              </a:schemeClr>
+            </a:lnRef>
+            <a:fillRef idx="1">
+              <a:schemeClr val="accent1"/>
+            </a:fillRef>
+            <a:effectRef idx="0">
+              <a:schemeClr val="accent1"/>
+            </a:effectRef>
+            <a:fontRef idx="minor">
+              <a:schemeClr val="lt1"/>
+            </a:fontRef>
+          </p:style>
+          <p:txBody>
+            <a:bodyPr rtlCol="0" anchor="ctr"/>
+            <a:lstStyle/>
+            <a:p>
+              <a:pPr algn="ctr"/>
+              <a:endParaRPr lang="es-419" sz="402" dirty="0"/>
+            </a:p>
+          </p:txBody>
+        </p:sp>
+        <p:cxnSp>
+          <p:nvCxnSpPr>
+            <p:cNvPr id="6" name="Connecteur droit 5">
+              <a:extLst>
+                <a:ext uri="{FF2B5EF4-FFF2-40B4-BE49-F238E27FC236}">
+                  <a16:creationId xmlns:a16="http://schemas.microsoft.com/office/drawing/2014/main" id="{866EE649-B965-487F-B745-B7CF988EC291}"/>
+                </a:ext>
+              </a:extLst>
+            </p:cNvPr>
+            <p:cNvCxnSpPr/>
+            <p:nvPr/>
+          </p:nvCxnSpPr>
+          <p:spPr>
+            <a:xfrm>
+              <a:off x="751840" y="670560"/>
+              <a:ext cx="720000" cy="720000"/>
+            </a:xfrm>
+            <a:prstGeom prst="line">
+              <a:avLst/>
+            </a:prstGeom>
+            <a:ln w="9525">
+              <a:solidFill>
+                <a:schemeClr val="bg1"/>
+              </a:solidFill>
+            </a:ln>
+          </p:spPr>
+          <p:style>
+            <a:lnRef idx="1">
+              <a:schemeClr val="accent1"/>
+            </a:lnRef>
+            <a:fillRef idx="0">
+              <a:schemeClr val="accent1"/>
+            </a:fillRef>
+            <a:effectRef idx="0">
+              <a:schemeClr val="accent1"/>
+            </a:effectRef>
+            <a:fontRef idx="minor">
+              <a:schemeClr val="tx1"/>
+            </a:fontRef>
+          </p:style>
+        </p:cxnSp>
+        <p:cxnSp>
+          <p:nvCxnSpPr>
+            <p:cNvPr id="7" name="Connecteur droit 6">
+              <a:extLst>
+                <a:ext uri="{FF2B5EF4-FFF2-40B4-BE49-F238E27FC236}">
+                  <a16:creationId xmlns:a16="http://schemas.microsoft.com/office/drawing/2014/main" id="{5A2DE221-7F58-467D-9CA4-75798F41574B}"/>
+                </a:ext>
+              </a:extLst>
+            </p:cNvPr>
+            <p:cNvCxnSpPr>
+              <a:cxnSpLocks/>
+            </p:cNvCxnSpPr>
+            <p:nvPr/>
+          </p:nvCxnSpPr>
+          <p:spPr>
+            <a:xfrm flipH="1">
+              <a:off x="751840" y="670560"/>
+              <a:ext cx="720000" cy="720000"/>
+            </a:xfrm>
+            <a:prstGeom prst="line">
+              <a:avLst/>
+            </a:prstGeom>
+            <a:ln w="9525">
+              <a:solidFill>
+                <a:schemeClr val="bg1"/>
+              </a:solidFill>
+            </a:ln>
+          </p:spPr>
+          <p:style>
+            <a:lnRef idx="1">
+              <a:schemeClr val="accent1"/>
+            </a:lnRef>
+            <a:fillRef idx="0">
+              <a:schemeClr val="accent1"/>
+            </a:fillRef>
+            <a:effectRef idx="0">
+              <a:schemeClr val="accent1"/>
+            </a:effectRef>
+            <a:fontRef idx="minor">
+              <a:schemeClr val="tx1"/>
+            </a:fontRef>
+          </p:style>
+        </p:cxnSp>
+      </p:grpSp>
+      <p:sp>
+        <p:nvSpPr>
+          <p:cNvPr id="8" name="Ellipse 7">
+            <a:extLst>
+              <a:ext uri="{FF2B5EF4-FFF2-40B4-BE49-F238E27FC236}">
+                <a16:creationId xmlns:a16="http://schemas.microsoft.com/office/drawing/2014/main" id="{9EFB738B-39DC-43FB-A427-51CF94B5A2D9}"/>
+              </a:ext>
+            </a:extLst>
+          </p:cNvPr>
+          <p:cNvSpPr/>
+          <p:nvPr/>
+        </p:nvSpPr>
+        <p:spPr>
+          <a:xfrm>
+            <a:off x="5561450" y="162198"/>
+            <a:ext cx="36000" cy="36000"/>
+          </a:xfrm>
+          <a:prstGeom prst="ellipse">
+            <a:avLst/>
+          </a:prstGeom>
+          <a:solidFill>
+            <a:schemeClr val="bg1"/>
+          </a:solidFill>
+          <a:ln w="9525">
+            <a:solidFill>
+              <a:schemeClr val="bg1"/>
+            </a:solidFill>
+          </a:ln>
+          <a:effectLst>
+            <a:glow rad="139700">
+              <a:schemeClr val="accent3">
+                <a:satMod val="175000"/>
+                <a:alpha val="40000"/>
+              </a:schemeClr>
+            </a:glow>
+          </a:effectLst>
+        </p:spPr>
+        <p:style>
+          <a:lnRef idx="2">
+            <a:schemeClr val="accent1">
+              <a:shade val="50000"/>
+            </a:schemeClr>
+          </a:lnRef>
+          <a:fillRef idx="1">
+            <a:schemeClr val="accent1"/>
+          </a:fillRef>
+          <a:effectRef idx="0">
+            <a:schemeClr val="accent1"/>
+          </a:effectRef>
+          <a:fontRef idx="minor">
+            <a:schemeClr val="lt1"/>
+          </a:fontRef>
+        </p:style>
+        <p:txBody>
+          <a:bodyPr rtlCol="0" anchor="ctr"/>
+          <a:lstStyle/>
+          <a:p>
+            <a:pPr algn="ctr"/>
+            <a:endParaRPr lang="es-419" sz="402" dirty="0"/>
+          </a:p>
+        </p:txBody>
+      </p:sp>
+    </p:spTree>
+    <p:extLst>
+      <p:ext uri="{BB962C8B-B14F-4D97-AF65-F5344CB8AC3E}">
+        <p14:creationId xmlns:p14="http://schemas.microsoft.com/office/powerpoint/2010/main" val="3336002141"/>
       </p:ext>
     </p:extLst>
   </p:cSld>
@@ -8525,6 +8525,264 @@
           <p:cNvPr id="2" name="Groupe 1">
             <a:extLst>
               <a:ext uri="{FF2B5EF4-FFF2-40B4-BE49-F238E27FC236}">
+                <a16:creationId xmlns:a16="http://schemas.microsoft.com/office/drawing/2014/main" id="{602AF9FB-C923-4653-AE3B-ABCC8FD3388B}"/>
+              </a:ext>
+            </a:extLst>
+          </p:cNvPr>
+          <p:cNvGrpSpPr/>
+          <p:nvPr/>
+        </p:nvGrpSpPr>
+        <p:grpSpPr>
+          <a:xfrm>
+            <a:off x="5399450" y="1440000"/>
+            <a:ext cx="360000" cy="360000"/>
+            <a:chOff x="751840" y="670560"/>
+            <a:chExt cx="720000" cy="720000"/>
+          </a:xfrm>
+          <a:solidFill>
+            <a:srgbClr val="FF0066"/>
+          </a:solidFill>
+        </p:grpSpPr>
+        <p:sp>
+          <p:nvSpPr>
+            <p:cNvPr id="3" name="Rectangle 2">
+              <a:extLst>
+                <a:ext uri="{FF2B5EF4-FFF2-40B4-BE49-F238E27FC236}">
+                  <a16:creationId xmlns:a16="http://schemas.microsoft.com/office/drawing/2014/main" id="{6176383E-EDA7-4EFC-BCE2-DB20B681690B}"/>
+                </a:ext>
+              </a:extLst>
+            </p:cNvPr>
+            <p:cNvSpPr/>
+            <p:nvPr/>
+          </p:nvSpPr>
+          <p:spPr>
+            <a:xfrm>
+              <a:off x="751840" y="670560"/>
+              <a:ext cx="720000" cy="720000"/>
+            </a:xfrm>
+            <a:prstGeom prst="rect">
+              <a:avLst/>
+            </a:prstGeom>
+            <a:grpFill/>
+            <a:ln w="9525"/>
+          </p:spPr>
+          <p:style>
+            <a:lnRef idx="2">
+              <a:schemeClr val="accent1">
+                <a:shade val="50000"/>
+              </a:schemeClr>
+            </a:lnRef>
+            <a:fillRef idx="1">
+              <a:schemeClr val="accent1"/>
+            </a:fillRef>
+            <a:effectRef idx="0">
+              <a:schemeClr val="accent1"/>
+            </a:effectRef>
+            <a:fontRef idx="minor">
+              <a:schemeClr val="lt1"/>
+            </a:fontRef>
+          </p:style>
+          <p:txBody>
+            <a:bodyPr rtlCol="0" anchor="ctr"/>
+            <a:lstStyle/>
+            <a:p>
+              <a:pPr algn="ctr"/>
+              <a:endParaRPr lang="es-419" sz="402" dirty="0"/>
+            </a:p>
+          </p:txBody>
+        </p:sp>
+        <p:cxnSp>
+          <p:nvCxnSpPr>
+            <p:cNvPr id="4" name="Connecteur droit 3">
+              <a:extLst>
+                <a:ext uri="{FF2B5EF4-FFF2-40B4-BE49-F238E27FC236}">
+                  <a16:creationId xmlns:a16="http://schemas.microsoft.com/office/drawing/2014/main" id="{D25F45CD-D504-4D29-8F48-B36E403A3FF7}"/>
+                </a:ext>
+              </a:extLst>
+            </p:cNvPr>
+            <p:cNvCxnSpPr/>
+            <p:nvPr/>
+          </p:nvCxnSpPr>
+          <p:spPr>
+            <a:xfrm>
+              <a:off x="751840" y="670560"/>
+              <a:ext cx="720000" cy="720000"/>
+            </a:xfrm>
+            <a:prstGeom prst="line">
+              <a:avLst/>
+            </a:prstGeom>
+            <a:grpFill/>
+            <a:ln w="9525">
+              <a:solidFill>
+                <a:schemeClr val="bg1"/>
+              </a:solidFill>
+            </a:ln>
+          </p:spPr>
+          <p:style>
+            <a:lnRef idx="1">
+              <a:schemeClr val="accent1"/>
+            </a:lnRef>
+            <a:fillRef idx="0">
+              <a:schemeClr val="accent1"/>
+            </a:fillRef>
+            <a:effectRef idx="0">
+              <a:schemeClr val="accent1"/>
+            </a:effectRef>
+            <a:fontRef idx="minor">
+              <a:schemeClr val="tx1"/>
+            </a:fontRef>
+          </p:style>
+        </p:cxnSp>
+        <p:cxnSp>
+          <p:nvCxnSpPr>
+            <p:cNvPr id="5" name="Connecteur droit 4">
+              <a:extLst>
+                <a:ext uri="{FF2B5EF4-FFF2-40B4-BE49-F238E27FC236}">
+                  <a16:creationId xmlns:a16="http://schemas.microsoft.com/office/drawing/2014/main" id="{AADCCDFD-3EB6-4B7F-B973-F80211AB2B3A}"/>
+                </a:ext>
+              </a:extLst>
+            </p:cNvPr>
+            <p:cNvCxnSpPr>
+              <a:cxnSpLocks/>
+            </p:cNvCxnSpPr>
+            <p:nvPr/>
+          </p:nvCxnSpPr>
+          <p:spPr>
+            <a:xfrm flipH="1">
+              <a:off x="751840" y="670560"/>
+              <a:ext cx="720000" cy="720000"/>
+            </a:xfrm>
+            <a:prstGeom prst="line">
+              <a:avLst/>
+            </a:prstGeom>
+            <a:grpFill/>
+            <a:ln w="9525">
+              <a:solidFill>
+                <a:schemeClr val="bg1"/>
+              </a:solidFill>
+            </a:ln>
+          </p:spPr>
+          <p:style>
+            <a:lnRef idx="1">
+              <a:schemeClr val="accent1"/>
+            </a:lnRef>
+            <a:fillRef idx="0">
+              <a:schemeClr val="accent1"/>
+            </a:fillRef>
+            <a:effectRef idx="0">
+              <a:schemeClr val="accent1"/>
+            </a:effectRef>
+            <a:fontRef idx="minor">
+              <a:schemeClr val="tx1"/>
+            </a:fontRef>
+          </p:style>
+        </p:cxnSp>
+      </p:grpSp>
+      <p:sp>
+        <p:nvSpPr>
+          <p:cNvPr id="6" name="Ellipse 5">
+            <a:extLst>
+              <a:ext uri="{FF2B5EF4-FFF2-40B4-BE49-F238E27FC236}">
+                <a16:creationId xmlns:a16="http://schemas.microsoft.com/office/drawing/2014/main" id="{21C60006-64CA-4A3A-AF9D-28EA7800F66F}"/>
+              </a:ext>
+            </a:extLst>
+          </p:cNvPr>
+          <p:cNvSpPr/>
+          <p:nvPr/>
+        </p:nvSpPr>
+        <p:spPr>
+          <a:xfrm>
+            <a:off x="5561450" y="1602000"/>
+            <a:ext cx="36000" cy="36000"/>
+          </a:xfrm>
+          <a:prstGeom prst="ellipse">
+            <a:avLst/>
+          </a:prstGeom>
+          <a:solidFill>
+            <a:schemeClr val="bg1"/>
+          </a:solidFill>
+          <a:ln w="9525">
+            <a:solidFill>
+              <a:schemeClr val="bg1"/>
+            </a:solidFill>
+          </a:ln>
+          <a:effectLst>
+            <a:glow rad="139700">
+              <a:schemeClr val="accent3">
+                <a:satMod val="175000"/>
+                <a:alpha val="40000"/>
+              </a:schemeClr>
+            </a:glow>
+          </a:effectLst>
+        </p:spPr>
+        <p:style>
+          <a:lnRef idx="2">
+            <a:schemeClr val="accent1">
+              <a:shade val="50000"/>
+            </a:schemeClr>
+          </a:lnRef>
+          <a:fillRef idx="1">
+            <a:schemeClr val="accent1"/>
+          </a:fillRef>
+          <a:effectRef idx="0">
+            <a:schemeClr val="accent1"/>
+          </a:effectRef>
+          <a:fontRef idx="minor">
+            <a:schemeClr val="lt1"/>
+          </a:fontRef>
+        </p:style>
+        <p:txBody>
+          <a:bodyPr rtlCol="0" anchor="ctr"/>
+          <a:lstStyle/>
+          <a:p>
+            <a:pPr algn="ctr"/>
+            <a:endParaRPr lang="es-419" sz="402" dirty="0"/>
+          </a:p>
+        </p:txBody>
+      </p:sp>
+    </p:spTree>
+    <p:extLst>
+      <p:ext uri="{BB962C8B-B14F-4D97-AF65-F5344CB8AC3E}">
+        <p14:creationId xmlns:p14="http://schemas.microsoft.com/office/powerpoint/2010/main" val="2192117781"/>
+      </p:ext>
+    </p:extLst>
+  </p:cSld>
+  <p:clrMapOvr>
+    <a:masterClrMapping/>
+  </p:clrMapOvr>
+  <mc:AlternateContent xmlns:mc="http://schemas.openxmlformats.org/markup-compatibility/2006" xmlns:p14="http://schemas.microsoft.com/office/powerpoint/2010/main">
+    <mc:Choice Requires="p14">
+      <p:transition spd="slow" p14:dur="2000" advClick="0" advTm="2000"/>
+    </mc:Choice>
+    <mc:Fallback xmlns="">
+      <p:transition spd="slow" advClick="0" advTm="2000"/>
+    </mc:Fallback>
+  </mc:AlternateContent>
+</p:sld>
+</file>
+
+<file path=ppt/slides/slide7.xml><?xml version="1.0" encoding="utf-8"?>
+<p:sld xmlns:a="http://schemas.openxmlformats.org/drawingml/2006/main" xmlns:r="http://schemas.openxmlformats.org/officeDocument/2006/relationships" xmlns:p="http://schemas.openxmlformats.org/presentationml/2006/main">
+  <p:cSld>
+    <p:spTree>
+      <p:nvGrpSpPr>
+        <p:cNvPr id="1" name=""/>
+        <p:cNvGrpSpPr/>
+        <p:nvPr/>
+      </p:nvGrpSpPr>
+      <p:grpSpPr>
+        <a:xfrm>
+          <a:off x="0" y="0"/>
+          <a:ext cx="0" cy="0"/>
+          <a:chOff x="0" y="0"/>
+          <a:chExt cx="0" cy="0"/>
+        </a:xfrm>
+      </p:grpSpPr>
+      <p:grpSp>
+        <p:nvGrpSpPr>
+          <p:cNvPr id="2" name="Groupe 1">
+            <a:extLst>
+              <a:ext uri="{FF2B5EF4-FFF2-40B4-BE49-F238E27FC236}">
                 <a16:creationId xmlns:a16="http://schemas.microsoft.com/office/drawing/2014/main" id="{9D551530-D4BD-4F4C-899D-EF5EE655F015}"/>
               </a:ext>
             </a:extLst>
@@ -8744,264 +9002,6 @@
     <p:extLst>
       <p:ext uri="{BB962C8B-B14F-4D97-AF65-F5344CB8AC3E}">
         <p14:creationId xmlns:p14="http://schemas.microsoft.com/office/powerpoint/2010/main" val="2519230693"/>
-      </p:ext>
-    </p:extLst>
-  </p:cSld>
-  <p:clrMapOvr>
-    <a:masterClrMapping/>
-  </p:clrMapOvr>
-  <mc:AlternateContent xmlns:mc="http://schemas.openxmlformats.org/markup-compatibility/2006" xmlns:p14="http://schemas.microsoft.com/office/powerpoint/2010/main">
-    <mc:Choice Requires="p14">
-      <p:transition spd="slow" p14:dur="2000" advClick="0" advTm="2000"/>
-    </mc:Choice>
-    <mc:Fallback xmlns="">
-      <p:transition spd="slow" advClick="0" advTm="2000"/>
-    </mc:Fallback>
-  </mc:AlternateContent>
-</p:sld>
-</file>
-
-<file path=ppt/slides/slide7.xml><?xml version="1.0" encoding="utf-8"?>
-<p:sld xmlns:a="http://schemas.openxmlformats.org/drawingml/2006/main" xmlns:r="http://schemas.openxmlformats.org/officeDocument/2006/relationships" xmlns:p="http://schemas.openxmlformats.org/presentationml/2006/main">
-  <p:cSld>
-    <p:spTree>
-      <p:nvGrpSpPr>
-        <p:cNvPr id="1" name=""/>
-        <p:cNvGrpSpPr/>
-        <p:nvPr/>
-      </p:nvGrpSpPr>
-      <p:grpSpPr>
-        <a:xfrm>
-          <a:off x="0" y="0"/>
-          <a:ext cx="0" cy="0"/>
-          <a:chOff x="0" y="0"/>
-          <a:chExt cx="0" cy="0"/>
-        </a:xfrm>
-      </p:grpSpPr>
-      <p:grpSp>
-        <p:nvGrpSpPr>
-          <p:cNvPr id="2" name="Groupe 1">
-            <a:extLst>
-              <a:ext uri="{FF2B5EF4-FFF2-40B4-BE49-F238E27FC236}">
-                <a16:creationId xmlns:a16="http://schemas.microsoft.com/office/drawing/2014/main" id="{602AF9FB-C923-4653-AE3B-ABCC8FD3388B}"/>
-              </a:ext>
-            </a:extLst>
-          </p:cNvPr>
-          <p:cNvGrpSpPr/>
-          <p:nvPr/>
-        </p:nvGrpSpPr>
-        <p:grpSpPr>
-          <a:xfrm>
-            <a:off x="5399450" y="1440000"/>
-            <a:ext cx="360000" cy="360000"/>
-            <a:chOff x="751840" y="670560"/>
-            <a:chExt cx="720000" cy="720000"/>
-          </a:xfrm>
-          <a:solidFill>
-            <a:srgbClr val="FF0066"/>
-          </a:solidFill>
-        </p:grpSpPr>
-        <p:sp>
-          <p:nvSpPr>
-            <p:cNvPr id="3" name="Rectangle 2">
-              <a:extLst>
-                <a:ext uri="{FF2B5EF4-FFF2-40B4-BE49-F238E27FC236}">
-                  <a16:creationId xmlns:a16="http://schemas.microsoft.com/office/drawing/2014/main" id="{6176383E-EDA7-4EFC-BCE2-DB20B681690B}"/>
-                </a:ext>
-              </a:extLst>
-            </p:cNvPr>
-            <p:cNvSpPr/>
-            <p:nvPr/>
-          </p:nvSpPr>
-          <p:spPr>
-            <a:xfrm>
-              <a:off x="751840" y="670560"/>
-              <a:ext cx="720000" cy="720000"/>
-            </a:xfrm>
-            <a:prstGeom prst="rect">
-              <a:avLst/>
-            </a:prstGeom>
-            <a:grpFill/>
-            <a:ln w="9525"/>
-          </p:spPr>
-          <p:style>
-            <a:lnRef idx="2">
-              <a:schemeClr val="accent1">
-                <a:shade val="50000"/>
-              </a:schemeClr>
-            </a:lnRef>
-            <a:fillRef idx="1">
-              <a:schemeClr val="accent1"/>
-            </a:fillRef>
-            <a:effectRef idx="0">
-              <a:schemeClr val="accent1"/>
-            </a:effectRef>
-            <a:fontRef idx="minor">
-              <a:schemeClr val="lt1"/>
-            </a:fontRef>
-          </p:style>
-          <p:txBody>
-            <a:bodyPr rtlCol="0" anchor="ctr"/>
-            <a:lstStyle/>
-            <a:p>
-              <a:pPr algn="ctr"/>
-              <a:endParaRPr lang="es-419" sz="402" dirty="0"/>
-            </a:p>
-          </p:txBody>
-        </p:sp>
-        <p:cxnSp>
-          <p:nvCxnSpPr>
-            <p:cNvPr id="4" name="Connecteur droit 3">
-              <a:extLst>
-                <a:ext uri="{FF2B5EF4-FFF2-40B4-BE49-F238E27FC236}">
-                  <a16:creationId xmlns:a16="http://schemas.microsoft.com/office/drawing/2014/main" id="{D25F45CD-D504-4D29-8F48-B36E403A3FF7}"/>
-                </a:ext>
-              </a:extLst>
-            </p:cNvPr>
-            <p:cNvCxnSpPr/>
-            <p:nvPr/>
-          </p:nvCxnSpPr>
-          <p:spPr>
-            <a:xfrm>
-              <a:off x="751840" y="670560"/>
-              <a:ext cx="720000" cy="720000"/>
-            </a:xfrm>
-            <a:prstGeom prst="line">
-              <a:avLst/>
-            </a:prstGeom>
-            <a:grpFill/>
-            <a:ln w="9525">
-              <a:solidFill>
-                <a:schemeClr val="bg1"/>
-              </a:solidFill>
-            </a:ln>
-          </p:spPr>
-          <p:style>
-            <a:lnRef idx="1">
-              <a:schemeClr val="accent1"/>
-            </a:lnRef>
-            <a:fillRef idx="0">
-              <a:schemeClr val="accent1"/>
-            </a:fillRef>
-            <a:effectRef idx="0">
-              <a:schemeClr val="accent1"/>
-            </a:effectRef>
-            <a:fontRef idx="minor">
-              <a:schemeClr val="tx1"/>
-            </a:fontRef>
-          </p:style>
-        </p:cxnSp>
-        <p:cxnSp>
-          <p:nvCxnSpPr>
-            <p:cNvPr id="5" name="Connecteur droit 4">
-              <a:extLst>
-                <a:ext uri="{FF2B5EF4-FFF2-40B4-BE49-F238E27FC236}">
-                  <a16:creationId xmlns:a16="http://schemas.microsoft.com/office/drawing/2014/main" id="{AADCCDFD-3EB6-4B7F-B973-F80211AB2B3A}"/>
-                </a:ext>
-              </a:extLst>
-            </p:cNvPr>
-            <p:cNvCxnSpPr>
-              <a:cxnSpLocks/>
-            </p:cNvCxnSpPr>
-            <p:nvPr/>
-          </p:nvCxnSpPr>
-          <p:spPr>
-            <a:xfrm flipH="1">
-              <a:off x="751840" y="670560"/>
-              <a:ext cx="720000" cy="720000"/>
-            </a:xfrm>
-            <a:prstGeom prst="line">
-              <a:avLst/>
-            </a:prstGeom>
-            <a:grpFill/>
-            <a:ln w="9525">
-              <a:solidFill>
-                <a:schemeClr val="bg1"/>
-              </a:solidFill>
-            </a:ln>
-          </p:spPr>
-          <p:style>
-            <a:lnRef idx="1">
-              <a:schemeClr val="accent1"/>
-            </a:lnRef>
-            <a:fillRef idx="0">
-              <a:schemeClr val="accent1"/>
-            </a:fillRef>
-            <a:effectRef idx="0">
-              <a:schemeClr val="accent1"/>
-            </a:effectRef>
-            <a:fontRef idx="minor">
-              <a:schemeClr val="tx1"/>
-            </a:fontRef>
-          </p:style>
-        </p:cxnSp>
-      </p:grpSp>
-      <p:sp>
-        <p:nvSpPr>
-          <p:cNvPr id="6" name="Ellipse 5">
-            <a:extLst>
-              <a:ext uri="{FF2B5EF4-FFF2-40B4-BE49-F238E27FC236}">
-                <a16:creationId xmlns:a16="http://schemas.microsoft.com/office/drawing/2014/main" id="{21C60006-64CA-4A3A-AF9D-28EA7800F66F}"/>
-              </a:ext>
-            </a:extLst>
-          </p:cNvPr>
-          <p:cNvSpPr/>
-          <p:nvPr/>
-        </p:nvSpPr>
-        <p:spPr>
-          <a:xfrm>
-            <a:off x="5561450" y="1602000"/>
-            <a:ext cx="36000" cy="36000"/>
-          </a:xfrm>
-          <a:prstGeom prst="ellipse">
-            <a:avLst/>
-          </a:prstGeom>
-          <a:solidFill>
-            <a:schemeClr val="bg1"/>
-          </a:solidFill>
-          <a:ln w="9525">
-            <a:solidFill>
-              <a:schemeClr val="bg1"/>
-            </a:solidFill>
-          </a:ln>
-          <a:effectLst>
-            <a:glow rad="139700">
-              <a:schemeClr val="accent3">
-                <a:satMod val="175000"/>
-                <a:alpha val="40000"/>
-              </a:schemeClr>
-            </a:glow>
-          </a:effectLst>
-        </p:spPr>
-        <p:style>
-          <a:lnRef idx="2">
-            <a:schemeClr val="accent1">
-              <a:shade val="50000"/>
-            </a:schemeClr>
-          </a:lnRef>
-          <a:fillRef idx="1">
-            <a:schemeClr val="accent1"/>
-          </a:fillRef>
-          <a:effectRef idx="0">
-            <a:schemeClr val="accent1"/>
-          </a:effectRef>
-          <a:fontRef idx="minor">
-            <a:schemeClr val="lt1"/>
-          </a:fontRef>
-        </p:style>
-        <p:txBody>
-          <a:bodyPr rtlCol="0" anchor="ctr"/>
-          <a:lstStyle/>
-          <a:p>
-            <a:pPr algn="ctr"/>
-            <a:endParaRPr lang="es-419" sz="402" dirty="0"/>
-          </a:p>
-        </p:txBody>
-      </p:sp>
-    </p:spTree>
-    <p:extLst>
-      <p:ext uri="{BB962C8B-B14F-4D97-AF65-F5344CB8AC3E}">
-        <p14:creationId xmlns:p14="http://schemas.microsoft.com/office/powerpoint/2010/main" val="2192117781"/>
       </p:ext>
     </p:extLst>
   </p:cSld>

</xml_diff>